<commit_message>
Adicionando apresentação no formato odp
</commit_message>
<xml_diff>
--- a/Dojo-DevOps-QA.pptx
+++ b/Dojo-DevOps-QA.pptx
@@ -75,19 +75,14 @@
         <p:txBody>
           <a:bodyPr lIns="0" rIns="0" tIns="0" bIns="0" anchor="ctr"/>
           <a:p>
+            <a:pPr algn="ctr"/>
             <a:r>
-              <a:rPr b="0" lang="pt-BR" sz="1800" spc="-1" strike="noStrike">
-                <a:solidFill>
-                  <a:srgbClr val="000000"/>
-                </a:solidFill>
+              <a:rPr b="0" lang="pt-BR" sz="4400" spc="-1" strike="noStrike">
                 <a:latin typeface="Arial"/>
               </a:rPr>
               <a:t>Click to move the slide</a:t>
             </a:r>
-            <a:endParaRPr b="0" lang="pt-BR" sz="1800" spc="-1" strike="noStrike">
-              <a:solidFill>
-                <a:srgbClr val="000000"/>
-              </a:solidFill>
+            <a:endParaRPr b="0" lang="pt-BR" sz="4400" spc="-1" strike="noStrike">
               <a:latin typeface="Arial"/>
             </a:endParaRPr>
           </a:p>
@@ -153,7 +148,7 @@
               <a:rPr b="0" lang="pt-BR" sz="1400" spc="-1" strike="noStrike">
                 <a:latin typeface="Times New Roman"/>
               </a:rPr>
-              <a:t>&lt;header&gt;</a:t>
+              <a:t> </a:t>
             </a:r>
             <a:endParaRPr b="0" lang="pt-BR" sz="1400" spc="-1" strike="noStrike">
               <a:latin typeface="Times New Roman"/>
@@ -188,7 +183,7 @@
               <a:rPr b="0" lang="pt-BR" sz="1400" spc="-1" strike="noStrike">
                 <a:latin typeface="Times New Roman"/>
               </a:rPr>
-              <a:t>&lt;date/time&gt;</a:t>
+              <a:t> </a:t>
             </a:r>
             <a:endParaRPr b="0" lang="pt-BR" sz="1400" spc="-1" strike="noStrike">
               <a:latin typeface="Times New Roman"/>
@@ -222,7 +217,7 @@
               <a:rPr b="0" lang="pt-BR" sz="1400" spc="-1" strike="noStrike">
                 <a:latin typeface="Times New Roman"/>
               </a:rPr>
-              <a:t>&lt;footer&gt;</a:t>
+              <a:t> </a:t>
             </a:r>
             <a:endParaRPr b="0" lang="pt-BR" sz="1400" spc="-1" strike="noStrike">
               <a:latin typeface="Times New Roman"/>
@@ -253,11 +248,11 @@
           <a:bodyPr lIns="0" rIns="0" tIns="0" bIns="0" anchor="b"/>
           <a:p>
             <a:pPr algn="r"/>
-            <a:fld id="{9DE6AB0F-1C09-4D03-97C2-D7ABBA9B9F6D}" type="slidenum">
+            <a:fld id="{14CB9CAF-7E09-4590-AE9F-57991E30ECFD}" type="slidenum">
               <a:rPr b="0" lang="pt-BR" sz="1400" spc="-1" strike="noStrike">
                 <a:latin typeface="Times New Roman"/>
               </a:rPr>
-              <a:t>&lt;number&gt;</a:t>
+              <a:t>1</a:t>
             </a:fld>
             <a:endParaRPr b="0" lang="pt-BR" sz="1400" spc="-1" strike="noStrike">
               <a:latin typeface="Times New Roman"/>
@@ -301,7 +296,7 @@
         <p:spPr>
           <a:xfrm>
             <a:off x="685800" y="4400640"/>
-            <a:ext cx="5485680" cy="3599640"/>
+            <a:ext cx="5485320" cy="3599280"/>
           </a:xfrm>
           <a:prstGeom prst="rect">
             <a:avLst/>
@@ -310,7 +305,7 @@
         <p:txBody>
           <a:bodyPr lIns="0" rIns="0" tIns="0" bIns="0"/>
           <a:p>
-            <a:pPr marL="216000" indent="-216000">
+            <a:pPr marL="216000" indent="-215640">
               <a:lnSpc>
                 <a:spcPct val="100000"/>
               </a:lnSpc>
@@ -336,7 +331,7 @@
         <p:spPr>
           <a:xfrm>
             <a:off x="3884760" y="8685360"/>
-            <a:ext cx="2971080" cy="457920"/>
+            <a:ext cx="2970720" cy="457560"/>
           </a:xfrm>
           <a:prstGeom prst="rect">
             <a:avLst/>
@@ -360,7 +355,7 @@
                 <a:spcPct val="100000"/>
               </a:lnSpc>
             </a:pPr>
-            <a:fld id="{2DD240FF-D38B-408A-83DA-66520711F6CB}" type="slidenum">
+            <a:fld id="{26ADC4CC-1C0C-46CD-8C94-CAD204A34891}" type="slidenum">
               <a:rPr b="0" lang="pt-BR" sz="1200" spc="-1" strike="noStrike">
                 <a:solidFill>
                   <a:srgbClr val="000000"/>
@@ -411,7 +406,7 @@
         <p:spPr>
           <a:xfrm>
             <a:off x="685800" y="4400640"/>
-            <a:ext cx="5485680" cy="3599640"/>
+            <a:ext cx="5485320" cy="3599280"/>
           </a:xfrm>
           <a:prstGeom prst="rect">
             <a:avLst/>
@@ -420,7 +415,7 @@
         <p:txBody>
           <a:bodyPr lIns="0" rIns="0" tIns="0" bIns="0"/>
           <a:p>
-            <a:pPr marL="216000" indent="-216000">
+            <a:pPr marL="216000" indent="-215640">
               <a:lnSpc>
                 <a:spcPct val="100000"/>
               </a:lnSpc>
@@ -446,7 +441,7 @@
         <p:spPr>
           <a:xfrm>
             <a:off x="3884760" y="8685360"/>
-            <a:ext cx="2971080" cy="457920"/>
+            <a:ext cx="2970720" cy="457560"/>
           </a:xfrm>
           <a:prstGeom prst="rect">
             <a:avLst/>
@@ -470,7 +465,7 @@
                 <a:spcPct val="100000"/>
               </a:lnSpc>
             </a:pPr>
-            <a:fld id="{6608A812-3C25-4460-9EBC-61E01FA599CF}" type="slidenum">
+            <a:fld id="{94DFD609-AC82-46DF-BA1D-2CCC2B356D13}" type="slidenum">
               <a:rPr b="0" lang="pt-BR" sz="1200" spc="-1" strike="noStrike">
                 <a:solidFill>
                   <a:srgbClr val="000000"/>
@@ -521,7 +516,7 @@
         <p:spPr>
           <a:xfrm>
             <a:off x="685800" y="4400640"/>
-            <a:ext cx="5485680" cy="3599640"/>
+            <a:ext cx="5485320" cy="3599280"/>
           </a:xfrm>
           <a:prstGeom prst="rect">
             <a:avLst/>
@@ -530,7 +525,7 @@
         <p:txBody>
           <a:bodyPr lIns="0" rIns="0" tIns="0" bIns="0"/>
           <a:p>
-            <a:pPr marL="216000" indent="-216000">
+            <a:pPr marL="216000" indent="-215640">
               <a:lnSpc>
                 <a:spcPct val="100000"/>
               </a:lnSpc>
@@ -556,7 +551,7 @@
         <p:spPr>
           <a:xfrm>
             <a:off x="3884760" y="8685360"/>
-            <a:ext cx="2971080" cy="457920"/>
+            <a:ext cx="2970720" cy="457560"/>
           </a:xfrm>
           <a:prstGeom prst="rect">
             <a:avLst/>
@@ -580,7 +575,7 @@
                 <a:spcPct val="100000"/>
               </a:lnSpc>
             </a:pPr>
-            <a:fld id="{5CCE8714-C359-491F-B16C-9D08587DC6D2}" type="slidenum">
+            <a:fld id="{72106451-0E53-489B-BCEC-5B5151B5F47C}" type="slidenum">
               <a:rPr b="0" lang="pt-BR" sz="1200" spc="-1" strike="noStrike">
                 <a:solidFill>
                   <a:srgbClr val="000000"/>
@@ -631,7 +626,7 @@
         <p:spPr>
           <a:xfrm>
             <a:off x="685800" y="4400640"/>
-            <a:ext cx="5485680" cy="3599640"/>
+            <a:ext cx="5485320" cy="3599280"/>
           </a:xfrm>
           <a:prstGeom prst="rect">
             <a:avLst/>
@@ -640,7 +635,7 @@
         <p:txBody>
           <a:bodyPr lIns="0" rIns="0" tIns="0" bIns="0"/>
           <a:p>
-            <a:pPr marL="216000" indent="-216000">
+            <a:pPr marL="216000" indent="-215640">
               <a:lnSpc>
                 <a:spcPct val="100000"/>
               </a:lnSpc>
@@ -666,7 +661,7 @@
         <p:spPr>
           <a:xfrm>
             <a:off x="3884760" y="8685360"/>
-            <a:ext cx="2971080" cy="457920"/>
+            <a:ext cx="2970720" cy="457560"/>
           </a:xfrm>
           <a:prstGeom prst="rect">
             <a:avLst/>
@@ -690,7 +685,7 @@
                 <a:spcPct val="100000"/>
               </a:lnSpc>
             </a:pPr>
-            <a:fld id="{7231C1A2-FA87-42A0-AA8D-F6A26C17F6E9}" type="slidenum">
+            <a:fld id="{E8149CF4-F87D-4836-A66E-F7F77273EA46}" type="slidenum">
               <a:rPr b="0" lang="pt-BR" sz="1200" spc="-1" strike="noStrike">
                 <a:solidFill>
                   <a:srgbClr val="000000"/>
@@ -741,7 +736,7 @@
         <p:spPr>
           <a:xfrm>
             <a:off x="685800" y="4400640"/>
-            <a:ext cx="5485680" cy="3599640"/>
+            <a:ext cx="5485320" cy="3599280"/>
           </a:xfrm>
           <a:prstGeom prst="rect">
             <a:avLst/>
@@ -750,7 +745,7 @@
         <p:txBody>
           <a:bodyPr lIns="0" rIns="0" tIns="0" bIns="0"/>
           <a:p>
-            <a:pPr marL="216000" indent="-216000">
+            <a:pPr marL="216000" indent="-215640">
               <a:lnSpc>
                 <a:spcPct val="100000"/>
               </a:lnSpc>
@@ -776,7 +771,7 @@
         <p:spPr>
           <a:xfrm>
             <a:off x="3884760" y="8685360"/>
-            <a:ext cx="2971080" cy="457920"/>
+            <a:ext cx="2970720" cy="457560"/>
           </a:xfrm>
           <a:prstGeom prst="rect">
             <a:avLst/>
@@ -800,7 +795,7 @@
                 <a:spcPct val="100000"/>
               </a:lnSpc>
             </a:pPr>
-            <a:fld id="{ADCC20EB-BD0C-4B72-B89C-FE571434C275}" type="slidenum">
+            <a:fld id="{99CE3CA1-FE15-44C3-896F-ABF3AA385A11}" type="slidenum">
               <a:rPr b="0" lang="pt-BR" sz="1200" spc="-1" strike="noStrike">
                 <a:solidFill>
                   <a:srgbClr val="000000"/>
@@ -851,7 +846,7 @@
         <p:spPr>
           <a:xfrm>
             <a:off x="685800" y="4400640"/>
-            <a:ext cx="5485680" cy="3599640"/>
+            <a:ext cx="5485320" cy="3599280"/>
           </a:xfrm>
           <a:prstGeom prst="rect">
             <a:avLst/>
@@ -860,7 +855,7 @@
         <p:txBody>
           <a:bodyPr lIns="0" rIns="0" tIns="0" bIns="0"/>
           <a:p>
-            <a:pPr marL="216000" indent="-216000">
+            <a:pPr marL="216000" indent="-215640">
               <a:lnSpc>
                 <a:spcPct val="100000"/>
               </a:lnSpc>
@@ -886,7 +881,7 @@
         <p:spPr>
           <a:xfrm>
             <a:off x="3884760" y="8685360"/>
-            <a:ext cx="2971080" cy="457920"/>
+            <a:ext cx="2970720" cy="457560"/>
           </a:xfrm>
           <a:prstGeom prst="rect">
             <a:avLst/>
@@ -910,7 +905,7 @@
                 <a:spcPct val="100000"/>
               </a:lnSpc>
             </a:pPr>
-            <a:fld id="{4D53D575-C0AD-4BA5-9DF3-9174BFF40469}" type="slidenum">
+            <a:fld id="{8E630745-C683-40DD-80C8-EF6AFB5F9726}" type="slidenum">
               <a:rPr b="0" lang="pt-BR" sz="1200" spc="-1" strike="noStrike">
                 <a:solidFill>
                   <a:srgbClr val="000000"/>
@@ -961,7 +956,7 @@
         <p:spPr>
           <a:xfrm>
             <a:off x="685800" y="4400640"/>
-            <a:ext cx="5485680" cy="3599640"/>
+            <a:ext cx="5485320" cy="3599280"/>
           </a:xfrm>
           <a:prstGeom prst="rect">
             <a:avLst/>
@@ -985,7 +980,7 @@
         <p:spPr>
           <a:xfrm>
             <a:off x="3884760" y="8685360"/>
-            <a:ext cx="2971080" cy="457920"/>
+            <a:ext cx="2970720" cy="457560"/>
           </a:xfrm>
           <a:prstGeom prst="rect">
             <a:avLst/>
@@ -1009,7 +1004,7 @@
                 <a:spcPct val="100000"/>
               </a:lnSpc>
             </a:pPr>
-            <a:fld id="{47A24F8A-67DC-404D-8658-0224B2D94C63}" type="slidenum">
+            <a:fld id="{8F7B88E8-0651-4275-907F-EB1516712104}" type="slidenum">
               <a:rPr b="0" lang="pt-BR" sz="1200" spc="-1" strike="noStrike">
                 <a:solidFill>
                   <a:srgbClr val="000000"/>
@@ -1060,7 +1055,7 @@
         <p:spPr>
           <a:xfrm>
             <a:off x="685800" y="4400640"/>
-            <a:ext cx="5485680" cy="3599640"/>
+            <a:ext cx="5485320" cy="3599280"/>
           </a:xfrm>
           <a:prstGeom prst="rect">
             <a:avLst/>
@@ -1069,7 +1064,7 @@
         <p:txBody>
           <a:bodyPr lIns="0" rIns="0" tIns="0" bIns="0"/>
           <a:p>
-            <a:pPr marL="216000" indent="-216000">
+            <a:pPr marL="216000" indent="-215640">
               <a:lnSpc>
                 <a:spcPct val="100000"/>
               </a:lnSpc>
@@ -1095,7 +1090,7 @@
         <p:spPr>
           <a:xfrm>
             <a:off x="3884760" y="8685360"/>
-            <a:ext cx="2971080" cy="457920"/>
+            <a:ext cx="2970720" cy="457560"/>
           </a:xfrm>
           <a:prstGeom prst="rect">
             <a:avLst/>
@@ -1119,7 +1114,7 @@
                 <a:spcPct val="100000"/>
               </a:lnSpc>
             </a:pPr>
-            <a:fld id="{822DDA56-AE56-421F-A067-B5750DBD858E}" type="slidenum">
+            <a:fld id="{FC112B1D-2255-45C0-90A1-D9DF085CD2B9}" type="slidenum">
               <a:rPr b="0" lang="pt-BR" sz="1200" spc="-1" strike="noStrike">
                 <a:solidFill>
                   <a:srgbClr val="000000"/>
@@ -1170,7 +1165,7 @@
         <p:spPr>
           <a:xfrm>
             <a:off x="685800" y="4400640"/>
-            <a:ext cx="5485680" cy="3599640"/>
+            <a:ext cx="5485320" cy="3599280"/>
           </a:xfrm>
           <a:prstGeom prst="rect">
             <a:avLst/>
@@ -1179,7 +1174,7 @@
         <p:txBody>
           <a:bodyPr lIns="0" rIns="0" tIns="0" bIns="0"/>
           <a:p>
-            <a:pPr marL="216000" indent="-216000">
+            <a:pPr marL="216000" indent="-215640">
               <a:lnSpc>
                 <a:spcPct val="100000"/>
               </a:lnSpc>
@@ -1205,7 +1200,7 @@
         <p:spPr>
           <a:xfrm>
             <a:off x="3884760" y="8685360"/>
-            <a:ext cx="2971080" cy="457920"/>
+            <a:ext cx="2970720" cy="457560"/>
           </a:xfrm>
           <a:prstGeom prst="rect">
             <a:avLst/>
@@ -1229,7 +1224,7 @@
                 <a:spcPct val="100000"/>
               </a:lnSpc>
             </a:pPr>
-            <a:fld id="{A8D2283B-F6A2-437F-9B48-839B431B8561}" type="slidenum">
+            <a:fld id="{F561507B-B9D4-4F11-9C08-FA1AEAA8D40E}" type="slidenum">
               <a:rPr b="0" lang="pt-BR" sz="1200" spc="-1" strike="noStrike">
                 <a:solidFill>
                   <a:srgbClr val="000000"/>
@@ -1280,7 +1275,7 @@
         <p:spPr>
           <a:xfrm>
             <a:off x="685800" y="4400640"/>
-            <a:ext cx="5485680" cy="3599640"/>
+            <a:ext cx="5485320" cy="3599280"/>
           </a:xfrm>
           <a:prstGeom prst="rect">
             <a:avLst/>
@@ -1289,7 +1284,7 @@
         <p:txBody>
           <a:bodyPr lIns="0" rIns="0" tIns="0" bIns="0"/>
           <a:p>
-            <a:pPr marL="216000" indent="-216000">
+            <a:pPr marL="216000" indent="-215640">
               <a:lnSpc>
                 <a:spcPct val="100000"/>
               </a:lnSpc>
@@ -1315,7 +1310,7 @@
         <p:spPr>
           <a:xfrm>
             <a:off x="3884760" y="8685360"/>
-            <a:ext cx="2971080" cy="457920"/>
+            <a:ext cx="2970720" cy="457560"/>
           </a:xfrm>
           <a:prstGeom prst="rect">
             <a:avLst/>
@@ -1339,7 +1334,7 @@
                 <a:spcPct val="100000"/>
               </a:lnSpc>
             </a:pPr>
-            <a:fld id="{74A53B1A-D1E5-448D-9248-6C990B8F8672}" type="slidenum">
+            <a:fld id="{E3BB8F94-4BF9-40D8-8B47-FCEBBD4D165C}" type="slidenum">
               <a:rPr b="0" lang="pt-BR" sz="1200" spc="-1" strike="noStrike">
                 <a:solidFill>
                   <a:srgbClr val="000000"/>
@@ -1390,7 +1385,7 @@
         <p:spPr>
           <a:xfrm>
             <a:off x="685800" y="4400640"/>
-            <a:ext cx="5485680" cy="3599640"/>
+            <a:ext cx="5485320" cy="3599280"/>
           </a:xfrm>
           <a:prstGeom prst="rect">
             <a:avLst/>
@@ -1414,7 +1409,7 @@
         <p:spPr>
           <a:xfrm>
             <a:off x="3884760" y="8685360"/>
-            <a:ext cx="2971080" cy="457920"/>
+            <a:ext cx="2970720" cy="457560"/>
           </a:xfrm>
           <a:prstGeom prst="rect">
             <a:avLst/>
@@ -1438,7 +1433,7 @@
                 <a:spcPct val="100000"/>
               </a:lnSpc>
             </a:pPr>
-            <a:fld id="{1A1818F1-59F9-415D-9E36-803127D8C18F}" type="slidenum">
+            <a:fld id="{81C0536A-0FBB-462D-81AF-424CCAE734F7}" type="slidenum">
               <a:rPr b="0" lang="pt-BR" sz="1200" spc="-1" strike="noStrike">
                 <a:solidFill>
                   <a:srgbClr val="000000"/>
@@ -1489,7 +1484,7 @@
         <p:spPr>
           <a:xfrm>
             <a:off x="685800" y="4400640"/>
-            <a:ext cx="5485680" cy="3599640"/>
+            <a:ext cx="5485320" cy="3599280"/>
           </a:xfrm>
           <a:prstGeom prst="rect">
             <a:avLst/>
@@ -1513,7 +1508,7 @@
         <p:spPr>
           <a:xfrm>
             <a:off x="3884760" y="8685360"/>
-            <a:ext cx="2971080" cy="457920"/>
+            <a:ext cx="2970720" cy="457560"/>
           </a:xfrm>
           <a:prstGeom prst="rect">
             <a:avLst/>
@@ -1537,7 +1532,7 @@
                 <a:spcPct val="100000"/>
               </a:lnSpc>
             </a:pPr>
-            <a:fld id="{6123991E-6B59-4D64-B7D8-E40E9D2770A3}" type="slidenum">
+            <a:fld id="{1D699DA5-C09A-4B47-BC17-676F0D7F4938}" type="slidenum">
               <a:rPr b="0" lang="pt-BR" sz="1200" spc="-1" strike="noStrike">
                 <a:solidFill>
                   <a:srgbClr val="000000"/>
@@ -1588,7 +1583,7 @@
         <p:spPr>
           <a:xfrm>
             <a:off x="685800" y="4400640"/>
-            <a:ext cx="5485680" cy="3599640"/>
+            <a:ext cx="5485320" cy="3599280"/>
           </a:xfrm>
           <a:prstGeom prst="rect">
             <a:avLst/>
@@ -1597,7 +1592,7 @@
         <p:txBody>
           <a:bodyPr lIns="0" rIns="0" tIns="0" bIns="0"/>
           <a:p>
-            <a:pPr marL="216000" indent="-216000">
+            <a:pPr marL="216000" indent="-215640">
               <a:lnSpc>
                 <a:spcPct val="100000"/>
               </a:lnSpc>
@@ -1623,7 +1618,7 @@
         <p:spPr>
           <a:xfrm>
             <a:off x="3884760" y="8685360"/>
-            <a:ext cx="2971080" cy="457920"/>
+            <a:ext cx="2970720" cy="457560"/>
           </a:xfrm>
           <a:prstGeom prst="rect">
             <a:avLst/>
@@ -1647,7 +1642,7 @@
                 <a:spcPct val="100000"/>
               </a:lnSpc>
             </a:pPr>
-            <a:fld id="{48A0BAA5-D4EE-46D7-AA49-EE2DF5C51D51}" type="slidenum">
+            <a:fld id="{FD8E3471-556D-4DB6-A339-516F5B39C9FE}" type="slidenum">
               <a:rPr b="0" lang="pt-BR" sz="1200" spc="-1" strike="noStrike">
                 <a:solidFill>
                   <a:srgbClr val="000000"/>
@@ -1698,7 +1693,7 @@
         <p:spPr>
           <a:xfrm>
             <a:off x="685800" y="4400640"/>
-            <a:ext cx="5485680" cy="3599640"/>
+            <a:ext cx="5485320" cy="3599280"/>
           </a:xfrm>
           <a:prstGeom prst="rect">
             <a:avLst/>
@@ -1722,7 +1717,7 @@
         <p:spPr>
           <a:xfrm>
             <a:off x="3884760" y="8685360"/>
-            <a:ext cx="2971080" cy="457920"/>
+            <a:ext cx="2970720" cy="457560"/>
           </a:xfrm>
           <a:prstGeom prst="rect">
             <a:avLst/>
@@ -1746,7 +1741,7 @@
                 <a:spcPct val="100000"/>
               </a:lnSpc>
             </a:pPr>
-            <a:fld id="{D4EF4BC5-475E-4FC2-B98A-42C70E6920DE}" type="slidenum">
+            <a:fld id="{AB8ED76C-6CB4-4ADB-9D0F-86DBC53B47BB}" type="slidenum">
               <a:rPr b="0" lang="pt-BR" sz="1200" spc="-1" strike="noStrike">
                 <a:solidFill>
                   <a:srgbClr val="000000"/>
@@ -1797,7 +1792,7 @@
         <p:spPr>
           <a:xfrm>
             <a:off x="685800" y="4400640"/>
-            <a:ext cx="5485680" cy="3599640"/>
+            <a:ext cx="5485320" cy="3599280"/>
           </a:xfrm>
           <a:prstGeom prst="rect">
             <a:avLst/>
@@ -1821,7 +1816,7 @@
         <p:spPr>
           <a:xfrm>
             <a:off x="3884760" y="8685360"/>
-            <a:ext cx="2971080" cy="457920"/>
+            <a:ext cx="2970720" cy="457560"/>
           </a:xfrm>
           <a:prstGeom prst="rect">
             <a:avLst/>
@@ -1845,7 +1840,7 @@
                 <a:spcPct val="100000"/>
               </a:lnSpc>
             </a:pPr>
-            <a:fld id="{C048E10F-2798-42E0-8A13-E7B6E5C7D2A8}" type="slidenum">
+            <a:fld id="{F552331E-6E5F-4DAF-8E37-07BD3DCBC77F}" type="slidenum">
               <a:rPr b="0" lang="pt-BR" sz="1200" spc="-1" strike="noStrike">
                 <a:solidFill>
                   <a:srgbClr val="000000"/>
@@ -1896,7 +1891,7 @@
         <p:spPr>
           <a:xfrm>
             <a:off x="685800" y="4400640"/>
-            <a:ext cx="5485680" cy="3599640"/>
+            <a:ext cx="5485320" cy="3599280"/>
           </a:xfrm>
           <a:prstGeom prst="rect">
             <a:avLst/>
@@ -1920,7 +1915,7 @@
         <p:spPr>
           <a:xfrm>
             <a:off x="3884760" y="8685360"/>
-            <a:ext cx="2971080" cy="457920"/>
+            <a:ext cx="2970720" cy="457560"/>
           </a:xfrm>
           <a:prstGeom prst="rect">
             <a:avLst/>
@@ -1944,7 +1939,7 @@
                 <a:spcPct val="100000"/>
               </a:lnSpc>
             </a:pPr>
-            <a:fld id="{79CF6CDE-A782-481C-84AE-796F6199D31A}" type="slidenum">
+            <a:fld id="{282FBC47-6F4F-4711-9A63-D6929E665322}" type="slidenum">
               <a:rPr b="0" lang="pt-BR" sz="1200" spc="-1" strike="noStrike">
                 <a:solidFill>
                   <a:srgbClr val="000000"/>
@@ -1995,7 +1990,7 @@
         <p:spPr>
           <a:xfrm>
             <a:off x="685800" y="4400640"/>
-            <a:ext cx="5485680" cy="3599640"/>
+            <a:ext cx="5485320" cy="3599280"/>
           </a:xfrm>
           <a:prstGeom prst="rect">
             <a:avLst/>
@@ -2004,7 +1999,7 @@
         <p:txBody>
           <a:bodyPr lIns="0" rIns="0" tIns="0" bIns="0"/>
           <a:p>
-            <a:pPr marL="216000" indent="-216000">
+            <a:pPr marL="216000" indent="-215640">
               <a:lnSpc>
                 <a:spcPct val="100000"/>
               </a:lnSpc>
@@ -2030,7 +2025,7 @@
         <p:spPr>
           <a:xfrm>
             <a:off x="3884760" y="8685360"/>
-            <a:ext cx="2971080" cy="457920"/>
+            <a:ext cx="2970720" cy="457560"/>
           </a:xfrm>
           <a:prstGeom prst="rect">
             <a:avLst/>
@@ -2054,7 +2049,7 @@
                 <a:spcPct val="100000"/>
               </a:lnSpc>
             </a:pPr>
-            <a:fld id="{58AD7E51-0FAF-4D5B-9B84-465BAB15F3EC}" type="slidenum">
+            <a:fld id="{7C5CE32E-0436-4C97-8AA4-79AE0A08FEA6}" type="slidenum">
               <a:rPr b="0" lang="pt-BR" sz="1200" spc="-1" strike="noStrike">
                 <a:solidFill>
                   <a:srgbClr val="000000"/>
@@ -2105,7 +2100,7 @@
         <p:spPr>
           <a:xfrm>
             <a:off x="685800" y="4400640"/>
-            <a:ext cx="5485680" cy="3599640"/>
+            <a:ext cx="5485320" cy="3599280"/>
           </a:xfrm>
           <a:prstGeom prst="rect">
             <a:avLst/>
@@ -2114,7 +2109,7 @@
         <p:txBody>
           <a:bodyPr lIns="0" rIns="0" tIns="0" bIns="0"/>
           <a:p>
-            <a:pPr marL="216000" indent="-216000">
+            <a:pPr marL="216000" indent="-215640">
               <a:lnSpc>
                 <a:spcPct val="100000"/>
               </a:lnSpc>
@@ -2140,7 +2135,7 @@
         <p:spPr>
           <a:xfrm>
             <a:off x="3884760" y="8685360"/>
-            <a:ext cx="2971080" cy="457920"/>
+            <a:ext cx="2970720" cy="457560"/>
           </a:xfrm>
           <a:prstGeom prst="rect">
             <a:avLst/>
@@ -2164,7 +2159,7 @@
                 <a:spcPct val="100000"/>
               </a:lnSpc>
             </a:pPr>
-            <a:fld id="{9D56ECD5-5772-4DE5-B506-ED1651A3DCF5}" type="slidenum">
+            <a:fld id="{ED8B40A6-893D-45DE-8AA0-DBB728C64940}" type="slidenum">
               <a:rPr b="0" lang="pt-BR" sz="1200" spc="-1" strike="noStrike">
                 <a:solidFill>
                   <a:srgbClr val="000000"/>
@@ -2246,10 +2241,8 @@
         <p:txBody>
           <a:bodyPr lIns="0" rIns="0" tIns="0" bIns="0" anchor="ctr"/>
           <a:p>
-            <a:endParaRPr b="0" lang="pt-BR" sz="1800" spc="-1" strike="noStrike">
-              <a:solidFill>
-                <a:srgbClr val="000000"/>
-              </a:solidFill>
+            <a:pPr algn="ctr"/>
+            <a:endParaRPr b="0" lang="pt-BR" sz="4400" spc="-1" strike="noStrike">
               <a:latin typeface="Arial"/>
             </a:endParaRPr>
           </a:p>
@@ -2279,10 +2272,7 @@
             <a:normAutofit/>
           </a:bodyPr>
           <a:p>
-            <a:endParaRPr b="0" lang="pt-BR" sz="1800" spc="-1" strike="noStrike">
-              <a:solidFill>
-                <a:srgbClr val="000000"/>
-              </a:solidFill>
+            <a:endParaRPr b="0" lang="pt-BR" sz="3200" spc="-1" strike="noStrike">
               <a:latin typeface="Arial"/>
             </a:endParaRPr>
           </a:p>
@@ -2312,10 +2302,7 @@
             <a:normAutofit/>
           </a:bodyPr>
           <a:p>
-            <a:endParaRPr b="0" lang="pt-BR" sz="1800" spc="-1" strike="noStrike">
-              <a:solidFill>
-                <a:srgbClr val="000000"/>
-              </a:solidFill>
+            <a:endParaRPr b="0" lang="pt-BR" sz="3200" spc="-1" strike="noStrike">
               <a:latin typeface="Arial"/>
             </a:endParaRPr>
           </a:p>
@@ -2365,10 +2352,8 @@
         <p:txBody>
           <a:bodyPr lIns="0" rIns="0" tIns="0" bIns="0" anchor="ctr"/>
           <a:p>
-            <a:endParaRPr b="0" lang="pt-BR" sz="1800" spc="-1" strike="noStrike">
-              <a:solidFill>
-                <a:srgbClr val="000000"/>
-              </a:solidFill>
+            <a:pPr algn="ctr"/>
+            <a:endParaRPr b="0" lang="pt-BR" sz="4400" spc="-1" strike="noStrike">
               <a:latin typeface="Arial"/>
             </a:endParaRPr>
           </a:p>
@@ -2398,10 +2383,7 @@
             <a:normAutofit/>
           </a:bodyPr>
           <a:p>
-            <a:endParaRPr b="0" lang="pt-BR" sz="1800" spc="-1" strike="noStrike">
-              <a:solidFill>
-                <a:srgbClr val="000000"/>
-              </a:solidFill>
+            <a:endParaRPr b="0" lang="pt-BR" sz="3200" spc="-1" strike="noStrike">
               <a:latin typeface="Arial"/>
             </a:endParaRPr>
           </a:p>
@@ -2431,10 +2413,7 @@
             <a:normAutofit/>
           </a:bodyPr>
           <a:p>
-            <a:endParaRPr b="0" lang="pt-BR" sz="1800" spc="-1" strike="noStrike">
-              <a:solidFill>
-                <a:srgbClr val="000000"/>
-              </a:solidFill>
+            <a:endParaRPr b="0" lang="pt-BR" sz="3200" spc="-1" strike="noStrike">
               <a:latin typeface="Arial"/>
             </a:endParaRPr>
           </a:p>
@@ -2464,10 +2443,7 @@
             <a:normAutofit/>
           </a:bodyPr>
           <a:p>
-            <a:endParaRPr b="0" lang="pt-BR" sz="1800" spc="-1" strike="noStrike">
-              <a:solidFill>
-                <a:srgbClr val="000000"/>
-              </a:solidFill>
+            <a:endParaRPr b="0" lang="pt-BR" sz="3200" spc="-1" strike="noStrike">
               <a:latin typeface="Arial"/>
             </a:endParaRPr>
           </a:p>
@@ -2497,10 +2473,7 @@
             <a:normAutofit/>
           </a:bodyPr>
           <a:p>
-            <a:endParaRPr b="0" lang="pt-BR" sz="1800" spc="-1" strike="noStrike">
-              <a:solidFill>
-                <a:srgbClr val="000000"/>
-              </a:solidFill>
+            <a:endParaRPr b="0" lang="pt-BR" sz="3200" spc="-1" strike="noStrike">
               <a:latin typeface="Arial"/>
             </a:endParaRPr>
           </a:p>
@@ -2550,10 +2523,8 @@
         <p:txBody>
           <a:bodyPr lIns="0" rIns="0" tIns="0" bIns="0" anchor="ctr"/>
           <a:p>
-            <a:endParaRPr b="0" lang="pt-BR" sz="1800" spc="-1" strike="noStrike">
-              <a:solidFill>
-                <a:srgbClr val="000000"/>
-              </a:solidFill>
+            <a:pPr algn="ctr"/>
+            <a:endParaRPr b="0" lang="pt-BR" sz="4400" spc="-1" strike="noStrike">
               <a:latin typeface="Arial"/>
             </a:endParaRPr>
           </a:p>
@@ -2583,10 +2554,7 @@
             <a:normAutofit/>
           </a:bodyPr>
           <a:p>
-            <a:endParaRPr b="0" lang="pt-BR" sz="1800" spc="-1" strike="noStrike">
-              <a:solidFill>
-                <a:srgbClr val="000000"/>
-              </a:solidFill>
+            <a:endParaRPr b="0" lang="pt-BR" sz="3200" spc="-1" strike="noStrike">
               <a:latin typeface="Arial"/>
             </a:endParaRPr>
           </a:p>
@@ -2616,10 +2584,7 @@
             <a:normAutofit/>
           </a:bodyPr>
           <a:p>
-            <a:endParaRPr b="0" lang="pt-BR" sz="1800" spc="-1" strike="noStrike">
-              <a:solidFill>
-                <a:srgbClr val="000000"/>
-              </a:solidFill>
+            <a:endParaRPr b="0" lang="pt-BR" sz="3200" spc="-1" strike="noStrike">
               <a:latin typeface="Arial"/>
             </a:endParaRPr>
           </a:p>
@@ -2649,10 +2614,7 @@
             <a:normAutofit/>
           </a:bodyPr>
           <a:p>
-            <a:endParaRPr b="0" lang="pt-BR" sz="1800" spc="-1" strike="noStrike">
-              <a:solidFill>
-                <a:srgbClr val="000000"/>
-              </a:solidFill>
+            <a:endParaRPr b="0" lang="pt-BR" sz="3200" spc="-1" strike="noStrike">
               <a:latin typeface="Arial"/>
             </a:endParaRPr>
           </a:p>
@@ -2682,10 +2644,7 @@
             <a:normAutofit/>
           </a:bodyPr>
           <a:p>
-            <a:endParaRPr b="0" lang="pt-BR" sz="1800" spc="-1" strike="noStrike">
-              <a:solidFill>
-                <a:srgbClr val="000000"/>
-              </a:solidFill>
+            <a:endParaRPr b="0" lang="pt-BR" sz="3200" spc="-1" strike="noStrike">
               <a:latin typeface="Arial"/>
             </a:endParaRPr>
           </a:p>
@@ -2715,10 +2674,7 @@
             <a:normAutofit/>
           </a:bodyPr>
           <a:p>
-            <a:endParaRPr b="0" lang="pt-BR" sz="1800" spc="-1" strike="noStrike">
-              <a:solidFill>
-                <a:srgbClr val="000000"/>
-              </a:solidFill>
+            <a:endParaRPr b="0" lang="pt-BR" sz="3200" spc="-1" strike="noStrike">
               <a:latin typeface="Arial"/>
             </a:endParaRPr>
           </a:p>
@@ -2748,10 +2704,7 @@
             <a:normAutofit/>
           </a:bodyPr>
           <a:p>
-            <a:endParaRPr b="0" lang="pt-BR" sz="1800" spc="-1" strike="noStrike">
-              <a:solidFill>
-                <a:srgbClr val="000000"/>
-              </a:solidFill>
+            <a:endParaRPr b="0" lang="pt-BR" sz="3200" spc="-1" strike="noStrike">
               <a:latin typeface="Arial"/>
             </a:endParaRPr>
           </a:p>
@@ -2823,10 +2776,8 @@
         <p:txBody>
           <a:bodyPr lIns="0" rIns="0" tIns="0" bIns="0" anchor="ctr"/>
           <a:p>
-            <a:endParaRPr b="0" lang="pt-BR" sz="1800" spc="-1" strike="noStrike">
-              <a:solidFill>
-                <a:srgbClr val="000000"/>
-              </a:solidFill>
+            <a:pPr algn="ctr"/>
+            <a:endParaRPr b="0" lang="pt-BR" sz="4400" spc="-1" strike="noStrike">
               <a:latin typeface="Arial"/>
             </a:endParaRPr>
           </a:p>
@@ -2905,10 +2856,8 @@
         <p:txBody>
           <a:bodyPr lIns="0" rIns="0" tIns="0" bIns="0" anchor="ctr"/>
           <a:p>
-            <a:endParaRPr b="0" lang="pt-BR" sz="1800" spc="-1" strike="noStrike">
-              <a:solidFill>
-                <a:srgbClr val="000000"/>
-              </a:solidFill>
+            <a:pPr algn="ctr"/>
+            <a:endParaRPr b="0" lang="pt-BR" sz="4400" spc="-1" strike="noStrike">
               <a:latin typeface="Arial"/>
             </a:endParaRPr>
           </a:p>
@@ -2938,10 +2887,7 @@
             <a:normAutofit/>
           </a:bodyPr>
           <a:p>
-            <a:endParaRPr b="0" lang="pt-BR" sz="1800" spc="-1" strike="noStrike">
-              <a:solidFill>
-                <a:srgbClr val="000000"/>
-              </a:solidFill>
+            <a:endParaRPr b="0" lang="pt-BR" sz="3200" spc="-1" strike="noStrike">
               <a:latin typeface="Arial"/>
             </a:endParaRPr>
           </a:p>
@@ -2991,10 +2937,8 @@
         <p:txBody>
           <a:bodyPr lIns="0" rIns="0" tIns="0" bIns="0" anchor="ctr"/>
           <a:p>
-            <a:endParaRPr b="0" lang="pt-BR" sz="1800" spc="-1" strike="noStrike">
-              <a:solidFill>
-                <a:srgbClr val="000000"/>
-              </a:solidFill>
+            <a:pPr algn="ctr"/>
+            <a:endParaRPr b="0" lang="pt-BR" sz="4400" spc="-1" strike="noStrike">
               <a:latin typeface="Arial"/>
             </a:endParaRPr>
           </a:p>
@@ -3024,10 +2968,7 @@
             <a:normAutofit/>
           </a:bodyPr>
           <a:p>
-            <a:endParaRPr b="0" lang="pt-BR" sz="1800" spc="-1" strike="noStrike">
-              <a:solidFill>
-                <a:srgbClr val="000000"/>
-              </a:solidFill>
+            <a:endParaRPr b="0" lang="pt-BR" sz="3200" spc="-1" strike="noStrike">
               <a:latin typeface="Arial"/>
             </a:endParaRPr>
           </a:p>
@@ -3057,10 +2998,7 @@
             <a:normAutofit/>
           </a:bodyPr>
           <a:p>
-            <a:endParaRPr b="0" lang="pt-BR" sz="1800" spc="-1" strike="noStrike">
-              <a:solidFill>
-                <a:srgbClr val="000000"/>
-              </a:solidFill>
+            <a:endParaRPr b="0" lang="pt-BR" sz="3200" spc="-1" strike="noStrike">
               <a:latin typeface="Arial"/>
             </a:endParaRPr>
           </a:p>
@@ -3110,10 +3048,8 @@
         <p:txBody>
           <a:bodyPr lIns="0" rIns="0" tIns="0" bIns="0" anchor="ctr"/>
           <a:p>
-            <a:endParaRPr b="0" lang="pt-BR" sz="1800" spc="-1" strike="noStrike">
-              <a:solidFill>
-                <a:srgbClr val="000000"/>
-              </a:solidFill>
+            <a:pPr algn="ctr"/>
+            <a:endParaRPr b="0" lang="pt-BR" sz="4400" spc="-1" strike="noStrike">
               <a:latin typeface="Arial"/>
             </a:endParaRPr>
           </a:p>
@@ -3214,10 +3150,8 @@
         <p:txBody>
           <a:bodyPr lIns="0" rIns="0" tIns="0" bIns="0" anchor="ctr"/>
           <a:p>
-            <a:endParaRPr b="0" lang="pt-BR" sz="1800" spc="-1" strike="noStrike">
-              <a:solidFill>
-                <a:srgbClr val="000000"/>
-              </a:solidFill>
+            <a:pPr algn="ctr"/>
+            <a:endParaRPr b="0" lang="pt-BR" sz="4400" spc="-1" strike="noStrike">
               <a:latin typeface="Arial"/>
             </a:endParaRPr>
           </a:p>
@@ -3247,10 +3181,7 @@
             <a:normAutofit/>
           </a:bodyPr>
           <a:p>
-            <a:endParaRPr b="0" lang="pt-BR" sz="1800" spc="-1" strike="noStrike">
-              <a:solidFill>
-                <a:srgbClr val="000000"/>
-              </a:solidFill>
+            <a:endParaRPr b="0" lang="pt-BR" sz="3200" spc="-1" strike="noStrike">
               <a:latin typeface="Arial"/>
             </a:endParaRPr>
           </a:p>
@@ -3280,10 +3211,7 @@
             <a:normAutofit/>
           </a:bodyPr>
           <a:p>
-            <a:endParaRPr b="0" lang="pt-BR" sz="1800" spc="-1" strike="noStrike">
-              <a:solidFill>
-                <a:srgbClr val="000000"/>
-              </a:solidFill>
+            <a:endParaRPr b="0" lang="pt-BR" sz="3200" spc="-1" strike="noStrike">
               <a:latin typeface="Arial"/>
             </a:endParaRPr>
           </a:p>
@@ -3313,10 +3241,7 @@
             <a:normAutofit/>
           </a:bodyPr>
           <a:p>
-            <a:endParaRPr b="0" lang="pt-BR" sz="1800" spc="-1" strike="noStrike">
-              <a:solidFill>
-                <a:srgbClr val="000000"/>
-              </a:solidFill>
+            <a:endParaRPr b="0" lang="pt-BR" sz="3200" spc="-1" strike="noStrike">
               <a:latin typeface="Arial"/>
             </a:endParaRPr>
           </a:p>
@@ -3366,10 +3291,8 @@
         <p:txBody>
           <a:bodyPr lIns="0" rIns="0" tIns="0" bIns="0" anchor="ctr"/>
           <a:p>
-            <a:endParaRPr b="0" lang="pt-BR" sz="1800" spc="-1" strike="noStrike">
-              <a:solidFill>
-                <a:srgbClr val="000000"/>
-              </a:solidFill>
+            <a:pPr algn="ctr"/>
+            <a:endParaRPr b="0" lang="pt-BR" sz="4400" spc="-1" strike="noStrike">
               <a:latin typeface="Arial"/>
             </a:endParaRPr>
           </a:p>
@@ -3448,10 +3371,8 @@
         <p:txBody>
           <a:bodyPr lIns="0" rIns="0" tIns="0" bIns="0" anchor="ctr"/>
           <a:p>
-            <a:endParaRPr b="0" lang="pt-BR" sz="1800" spc="-1" strike="noStrike">
-              <a:solidFill>
-                <a:srgbClr val="000000"/>
-              </a:solidFill>
+            <a:pPr algn="ctr"/>
+            <a:endParaRPr b="0" lang="pt-BR" sz="4400" spc="-1" strike="noStrike">
               <a:latin typeface="Arial"/>
             </a:endParaRPr>
           </a:p>
@@ -3481,10 +3402,7 @@
             <a:normAutofit/>
           </a:bodyPr>
           <a:p>
-            <a:endParaRPr b="0" lang="pt-BR" sz="1800" spc="-1" strike="noStrike">
-              <a:solidFill>
-                <a:srgbClr val="000000"/>
-              </a:solidFill>
+            <a:endParaRPr b="0" lang="pt-BR" sz="3200" spc="-1" strike="noStrike">
               <a:latin typeface="Arial"/>
             </a:endParaRPr>
           </a:p>
@@ -3514,10 +3432,7 @@
             <a:normAutofit/>
           </a:bodyPr>
           <a:p>
-            <a:endParaRPr b="0" lang="pt-BR" sz="1800" spc="-1" strike="noStrike">
-              <a:solidFill>
-                <a:srgbClr val="000000"/>
-              </a:solidFill>
+            <a:endParaRPr b="0" lang="pt-BR" sz="3200" spc="-1" strike="noStrike">
               <a:latin typeface="Arial"/>
             </a:endParaRPr>
           </a:p>
@@ -3547,10 +3462,7 @@
             <a:normAutofit/>
           </a:bodyPr>
           <a:p>
-            <a:endParaRPr b="0" lang="pt-BR" sz="1800" spc="-1" strike="noStrike">
-              <a:solidFill>
-                <a:srgbClr val="000000"/>
-              </a:solidFill>
+            <a:endParaRPr b="0" lang="pt-BR" sz="3200" spc="-1" strike="noStrike">
               <a:latin typeface="Arial"/>
             </a:endParaRPr>
           </a:p>
@@ -3600,10 +3512,8 @@
         <p:txBody>
           <a:bodyPr lIns="0" rIns="0" tIns="0" bIns="0" anchor="ctr"/>
           <a:p>
-            <a:endParaRPr b="0" lang="pt-BR" sz="1800" spc="-1" strike="noStrike">
-              <a:solidFill>
-                <a:srgbClr val="000000"/>
-              </a:solidFill>
+            <a:pPr algn="ctr"/>
+            <a:endParaRPr b="0" lang="pt-BR" sz="4400" spc="-1" strike="noStrike">
               <a:latin typeface="Arial"/>
             </a:endParaRPr>
           </a:p>
@@ -3633,10 +3543,7 @@
             <a:normAutofit/>
           </a:bodyPr>
           <a:p>
-            <a:endParaRPr b="0" lang="pt-BR" sz="1800" spc="-1" strike="noStrike">
-              <a:solidFill>
-                <a:srgbClr val="000000"/>
-              </a:solidFill>
+            <a:endParaRPr b="0" lang="pt-BR" sz="3200" spc="-1" strike="noStrike">
               <a:latin typeface="Arial"/>
             </a:endParaRPr>
           </a:p>
@@ -3666,10 +3573,7 @@
             <a:normAutofit/>
           </a:bodyPr>
           <a:p>
-            <a:endParaRPr b="0" lang="pt-BR" sz="1800" spc="-1" strike="noStrike">
-              <a:solidFill>
-                <a:srgbClr val="000000"/>
-              </a:solidFill>
+            <a:endParaRPr b="0" lang="pt-BR" sz="3200" spc="-1" strike="noStrike">
               <a:latin typeface="Arial"/>
             </a:endParaRPr>
           </a:p>
@@ -3699,10 +3603,7 @@
             <a:normAutofit/>
           </a:bodyPr>
           <a:p>
-            <a:endParaRPr b="0" lang="pt-BR" sz="1800" spc="-1" strike="noStrike">
-              <a:solidFill>
-                <a:srgbClr val="000000"/>
-              </a:solidFill>
+            <a:endParaRPr b="0" lang="pt-BR" sz="3200" spc="-1" strike="noStrike">
               <a:latin typeface="Arial"/>
             </a:endParaRPr>
           </a:p>
@@ -3752,10 +3653,8 @@
         <p:txBody>
           <a:bodyPr lIns="0" rIns="0" tIns="0" bIns="0" anchor="ctr"/>
           <a:p>
-            <a:endParaRPr b="0" lang="pt-BR" sz="1800" spc="-1" strike="noStrike">
-              <a:solidFill>
-                <a:srgbClr val="000000"/>
-              </a:solidFill>
+            <a:pPr algn="ctr"/>
+            <a:endParaRPr b="0" lang="pt-BR" sz="4400" spc="-1" strike="noStrike">
               <a:latin typeface="Arial"/>
             </a:endParaRPr>
           </a:p>
@@ -3785,10 +3684,7 @@
             <a:normAutofit/>
           </a:bodyPr>
           <a:p>
-            <a:endParaRPr b="0" lang="pt-BR" sz="1800" spc="-1" strike="noStrike">
-              <a:solidFill>
-                <a:srgbClr val="000000"/>
-              </a:solidFill>
+            <a:endParaRPr b="0" lang="pt-BR" sz="3200" spc="-1" strike="noStrike">
               <a:latin typeface="Arial"/>
             </a:endParaRPr>
           </a:p>
@@ -3818,10 +3714,7 @@
             <a:normAutofit/>
           </a:bodyPr>
           <a:p>
-            <a:endParaRPr b="0" lang="pt-BR" sz="1800" spc="-1" strike="noStrike">
-              <a:solidFill>
-                <a:srgbClr val="000000"/>
-              </a:solidFill>
+            <a:endParaRPr b="0" lang="pt-BR" sz="3200" spc="-1" strike="noStrike">
               <a:latin typeface="Arial"/>
             </a:endParaRPr>
           </a:p>
@@ -3871,10 +3764,8 @@
         <p:txBody>
           <a:bodyPr lIns="0" rIns="0" tIns="0" bIns="0" anchor="ctr"/>
           <a:p>
-            <a:endParaRPr b="0" lang="pt-BR" sz="1800" spc="-1" strike="noStrike">
-              <a:solidFill>
-                <a:srgbClr val="000000"/>
-              </a:solidFill>
+            <a:pPr algn="ctr"/>
+            <a:endParaRPr b="0" lang="pt-BR" sz="4400" spc="-1" strike="noStrike">
               <a:latin typeface="Arial"/>
             </a:endParaRPr>
           </a:p>
@@ -3904,10 +3795,7 @@
             <a:normAutofit/>
           </a:bodyPr>
           <a:p>
-            <a:endParaRPr b="0" lang="pt-BR" sz="1800" spc="-1" strike="noStrike">
-              <a:solidFill>
-                <a:srgbClr val="000000"/>
-              </a:solidFill>
+            <a:endParaRPr b="0" lang="pt-BR" sz="3200" spc="-1" strike="noStrike">
               <a:latin typeface="Arial"/>
             </a:endParaRPr>
           </a:p>
@@ -3937,10 +3825,7 @@
             <a:normAutofit/>
           </a:bodyPr>
           <a:p>
-            <a:endParaRPr b="0" lang="pt-BR" sz="1800" spc="-1" strike="noStrike">
-              <a:solidFill>
-                <a:srgbClr val="000000"/>
-              </a:solidFill>
+            <a:endParaRPr b="0" lang="pt-BR" sz="3200" spc="-1" strike="noStrike">
               <a:latin typeface="Arial"/>
             </a:endParaRPr>
           </a:p>
@@ -3970,10 +3855,7 @@
             <a:normAutofit/>
           </a:bodyPr>
           <a:p>
-            <a:endParaRPr b="0" lang="pt-BR" sz="1800" spc="-1" strike="noStrike">
-              <a:solidFill>
-                <a:srgbClr val="000000"/>
-              </a:solidFill>
+            <a:endParaRPr b="0" lang="pt-BR" sz="3200" spc="-1" strike="noStrike">
               <a:latin typeface="Arial"/>
             </a:endParaRPr>
           </a:p>
@@ -4003,10 +3885,7 @@
             <a:normAutofit/>
           </a:bodyPr>
           <a:p>
-            <a:endParaRPr b="0" lang="pt-BR" sz="1800" spc="-1" strike="noStrike">
-              <a:solidFill>
-                <a:srgbClr val="000000"/>
-              </a:solidFill>
+            <a:endParaRPr b="0" lang="pt-BR" sz="3200" spc="-1" strike="noStrike">
               <a:latin typeface="Arial"/>
             </a:endParaRPr>
           </a:p>
@@ -4056,10 +3935,8 @@
         <p:txBody>
           <a:bodyPr lIns="0" rIns="0" tIns="0" bIns="0" anchor="ctr"/>
           <a:p>
-            <a:endParaRPr b="0" lang="pt-BR" sz="1800" spc="-1" strike="noStrike">
-              <a:solidFill>
-                <a:srgbClr val="000000"/>
-              </a:solidFill>
+            <a:pPr algn="ctr"/>
+            <a:endParaRPr b="0" lang="pt-BR" sz="4400" spc="-1" strike="noStrike">
               <a:latin typeface="Arial"/>
             </a:endParaRPr>
           </a:p>
@@ -4089,10 +3966,7 @@
             <a:normAutofit/>
           </a:bodyPr>
           <a:p>
-            <a:endParaRPr b="0" lang="pt-BR" sz="1800" spc="-1" strike="noStrike">
-              <a:solidFill>
-                <a:srgbClr val="000000"/>
-              </a:solidFill>
+            <a:endParaRPr b="0" lang="pt-BR" sz="3200" spc="-1" strike="noStrike">
               <a:latin typeface="Arial"/>
             </a:endParaRPr>
           </a:p>
@@ -4122,10 +3996,7 @@
             <a:normAutofit/>
           </a:bodyPr>
           <a:p>
-            <a:endParaRPr b="0" lang="pt-BR" sz="1800" spc="-1" strike="noStrike">
-              <a:solidFill>
-                <a:srgbClr val="000000"/>
-              </a:solidFill>
+            <a:endParaRPr b="0" lang="pt-BR" sz="3200" spc="-1" strike="noStrike">
               <a:latin typeface="Arial"/>
             </a:endParaRPr>
           </a:p>
@@ -4155,10 +4026,7 @@
             <a:normAutofit/>
           </a:bodyPr>
           <a:p>
-            <a:endParaRPr b="0" lang="pt-BR" sz="1800" spc="-1" strike="noStrike">
-              <a:solidFill>
-                <a:srgbClr val="000000"/>
-              </a:solidFill>
+            <a:endParaRPr b="0" lang="pt-BR" sz="3200" spc="-1" strike="noStrike">
               <a:latin typeface="Arial"/>
             </a:endParaRPr>
           </a:p>
@@ -4188,10 +4056,7 @@
             <a:normAutofit/>
           </a:bodyPr>
           <a:p>
-            <a:endParaRPr b="0" lang="pt-BR" sz="1800" spc="-1" strike="noStrike">
-              <a:solidFill>
-                <a:srgbClr val="000000"/>
-              </a:solidFill>
+            <a:endParaRPr b="0" lang="pt-BR" sz="3200" spc="-1" strike="noStrike">
               <a:latin typeface="Arial"/>
             </a:endParaRPr>
           </a:p>
@@ -4221,10 +4086,7 @@
             <a:normAutofit/>
           </a:bodyPr>
           <a:p>
-            <a:endParaRPr b="0" lang="pt-BR" sz="1800" spc="-1" strike="noStrike">
-              <a:solidFill>
-                <a:srgbClr val="000000"/>
-              </a:solidFill>
+            <a:endParaRPr b="0" lang="pt-BR" sz="3200" spc="-1" strike="noStrike">
               <a:latin typeface="Arial"/>
             </a:endParaRPr>
           </a:p>
@@ -4254,10 +4116,7 @@
             <a:normAutofit/>
           </a:bodyPr>
           <a:p>
-            <a:endParaRPr b="0" lang="pt-BR" sz="1800" spc="-1" strike="noStrike">
-              <a:solidFill>
-                <a:srgbClr val="000000"/>
-              </a:solidFill>
+            <a:endParaRPr b="0" lang="pt-BR" sz="3200" spc="-1" strike="noStrike">
               <a:latin typeface="Arial"/>
             </a:endParaRPr>
           </a:p>
@@ -4329,10 +4188,8 @@
         <p:txBody>
           <a:bodyPr lIns="0" rIns="0" tIns="0" bIns="0" anchor="ctr"/>
           <a:p>
-            <a:endParaRPr b="0" lang="pt-BR" sz="1800" spc="-1" strike="noStrike">
-              <a:solidFill>
-                <a:srgbClr val="000000"/>
-              </a:solidFill>
+            <a:pPr algn="ctr"/>
+            <a:endParaRPr b="0" lang="pt-BR" sz="4400" spc="-1" strike="noStrike">
               <a:latin typeface="Arial"/>
             </a:endParaRPr>
           </a:p>
@@ -4411,10 +4268,8 @@
         <p:txBody>
           <a:bodyPr lIns="0" rIns="0" tIns="0" bIns="0" anchor="ctr"/>
           <a:p>
-            <a:endParaRPr b="0" lang="pt-BR" sz="1800" spc="-1" strike="noStrike">
-              <a:solidFill>
-                <a:srgbClr val="000000"/>
-              </a:solidFill>
+            <a:pPr algn="ctr"/>
+            <a:endParaRPr b="0" lang="pt-BR" sz="4400" spc="-1" strike="noStrike">
               <a:latin typeface="Arial"/>
             </a:endParaRPr>
           </a:p>
@@ -4444,10 +4299,7 @@
             <a:normAutofit/>
           </a:bodyPr>
           <a:p>
-            <a:endParaRPr b="0" lang="pt-BR" sz="1800" spc="-1" strike="noStrike">
-              <a:solidFill>
-                <a:srgbClr val="000000"/>
-              </a:solidFill>
+            <a:endParaRPr b="0" lang="pt-BR" sz="3200" spc="-1" strike="noStrike">
               <a:latin typeface="Arial"/>
             </a:endParaRPr>
           </a:p>
@@ -4497,10 +4349,8 @@
         <p:txBody>
           <a:bodyPr lIns="0" rIns="0" tIns="0" bIns="0" anchor="ctr"/>
           <a:p>
-            <a:endParaRPr b="0" lang="pt-BR" sz="1800" spc="-1" strike="noStrike">
-              <a:solidFill>
-                <a:srgbClr val="000000"/>
-              </a:solidFill>
+            <a:pPr algn="ctr"/>
+            <a:endParaRPr b="0" lang="pt-BR" sz="4400" spc="-1" strike="noStrike">
               <a:latin typeface="Arial"/>
             </a:endParaRPr>
           </a:p>
@@ -4530,10 +4380,7 @@
             <a:normAutofit/>
           </a:bodyPr>
           <a:p>
-            <a:endParaRPr b="0" lang="pt-BR" sz="1800" spc="-1" strike="noStrike">
-              <a:solidFill>
-                <a:srgbClr val="000000"/>
-              </a:solidFill>
+            <a:endParaRPr b="0" lang="pt-BR" sz="3200" spc="-1" strike="noStrike">
               <a:latin typeface="Arial"/>
             </a:endParaRPr>
           </a:p>
@@ -4563,10 +4410,7 @@
             <a:normAutofit/>
           </a:bodyPr>
           <a:p>
-            <a:endParaRPr b="0" lang="pt-BR" sz="1800" spc="-1" strike="noStrike">
-              <a:solidFill>
-                <a:srgbClr val="000000"/>
-              </a:solidFill>
+            <a:endParaRPr b="0" lang="pt-BR" sz="3200" spc="-1" strike="noStrike">
               <a:latin typeface="Arial"/>
             </a:endParaRPr>
           </a:p>
@@ -4616,10 +4460,8 @@
         <p:txBody>
           <a:bodyPr lIns="0" rIns="0" tIns="0" bIns="0" anchor="ctr"/>
           <a:p>
-            <a:endParaRPr b="0" lang="pt-BR" sz="1800" spc="-1" strike="noStrike">
-              <a:solidFill>
-                <a:srgbClr val="000000"/>
-              </a:solidFill>
+            <a:pPr algn="ctr"/>
+            <a:endParaRPr b="0" lang="pt-BR" sz="4400" spc="-1" strike="noStrike">
               <a:latin typeface="Arial"/>
             </a:endParaRPr>
           </a:p>
@@ -4669,10 +4511,8 @@
         <p:txBody>
           <a:bodyPr lIns="0" rIns="0" tIns="0" bIns="0" anchor="ctr"/>
           <a:p>
-            <a:endParaRPr b="0" lang="pt-BR" sz="1800" spc="-1" strike="noStrike">
-              <a:solidFill>
-                <a:srgbClr val="000000"/>
-              </a:solidFill>
+            <a:pPr algn="ctr"/>
+            <a:endParaRPr b="0" lang="pt-BR" sz="4400" spc="-1" strike="noStrike">
               <a:latin typeface="Arial"/>
             </a:endParaRPr>
           </a:p>
@@ -4702,10 +4542,7 @@
             <a:normAutofit/>
           </a:bodyPr>
           <a:p>
-            <a:endParaRPr b="0" lang="pt-BR" sz="1800" spc="-1" strike="noStrike">
-              <a:solidFill>
-                <a:srgbClr val="000000"/>
-              </a:solidFill>
+            <a:endParaRPr b="0" lang="pt-BR" sz="3200" spc="-1" strike="noStrike">
               <a:latin typeface="Arial"/>
             </a:endParaRPr>
           </a:p>
@@ -4806,10 +4643,8 @@
         <p:txBody>
           <a:bodyPr lIns="0" rIns="0" tIns="0" bIns="0" anchor="ctr"/>
           <a:p>
-            <a:endParaRPr b="0" lang="pt-BR" sz="1800" spc="-1" strike="noStrike">
-              <a:solidFill>
-                <a:srgbClr val="000000"/>
-              </a:solidFill>
+            <a:pPr algn="ctr"/>
+            <a:endParaRPr b="0" lang="pt-BR" sz="4400" spc="-1" strike="noStrike">
               <a:latin typeface="Arial"/>
             </a:endParaRPr>
           </a:p>
@@ -4839,10 +4674,7 @@
             <a:normAutofit/>
           </a:bodyPr>
           <a:p>
-            <a:endParaRPr b="0" lang="pt-BR" sz="1800" spc="-1" strike="noStrike">
-              <a:solidFill>
-                <a:srgbClr val="000000"/>
-              </a:solidFill>
+            <a:endParaRPr b="0" lang="pt-BR" sz="3200" spc="-1" strike="noStrike">
               <a:latin typeface="Arial"/>
             </a:endParaRPr>
           </a:p>
@@ -4872,10 +4704,7 @@
             <a:normAutofit/>
           </a:bodyPr>
           <a:p>
-            <a:endParaRPr b="0" lang="pt-BR" sz="1800" spc="-1" strike="noStrike">
-              <a:solidFill>
-                <a:srgbClr val="000000"/>
-              </a:solidFill>
+            <a:endParaRPr b="0" lang="pt-BR" sz="3200" spc="-1" strike="noStrike">
               <a:latin typeface="Arial"/>
             </a:endParaRPr>
           </a:p>
@@ -4905,10 +4734,7 @@
             <a:normAutofit/>
           </a:bodyPr>
           <a:p>
-            <a:endParaRPr b="0" lang="pt-BR" sz="1800" spc="-1" strike="noStrike">
-              <a:solidFill>
-                <a:srgbClr val="000000"/>
-              </a:solidFill>
+            <a:endParaRPr b="0" lang="pt-BR" sz="3200" spc="-1" strike="noStrike">
               <a:latin typeface="Arial"/>
             </a:endParaRPr>
           </a:p>
@@ -4958,10 +4784,8 @@
         <p:txBody>
           <a:bodyPr lIns="0" rIns="0" tIns="0" bIns="0" anchor="ctr"/>
           <a:p>
-            <a:endParaRPr b="0" lang="pt-BR" sz="1800" spc="-1" strike="noStrike">
-              <a:solidFill>
-                <a:srgbClr val="000000"/>
-              </a:solidFill>
+            <a:pPr algn="ctr"/>
+            <a:endParaRPr b="0" lang="pt-BR" sz="4400" spc="-1" strike="noStrike">
               <a:latin typeface="Arial"/>
             </a:endParaRPr>
           </a:p>
@@ -4991,10 +4815,7 @@
             <a:normAutofit/>
           </a:bodyPr>
           <a:p>
-            <a:endParaRPr b="0" lang="pt-BR" sz="1800" spc="-1" strike="noStrike">
-              <a:solidFill>
-                <a:srgbClr val="000000"/>
-              </a:solidFill>
+            <a:endParaRPr b="0" lang="pt-BR" sz="3200" spc="-1" strike="noStrike">
               <a:latin typeface="Arial"/>
             </a:endParaRPr>
           </a:p>
@@ -5024,10 +4845,7 @@
             <a:normAutofit/>
           </a:bodyPr>
           <a:p>
-            <a:endParaRPr b="0" lang="pt-BR" sz="1800" spc="-1" strike="noStrike">
-              <a:solidFill>
-                <a:srgbClr val="000000"/>
-              </a:solidFill>
+            <a:endParaRPr b="0" lang="pt-BR" sz="3200" spc="-1" strike="noStrike">
               <a:latin typeface="Arial"/>
             </a:endParaRPr>
           </a:p>
@@ -5057,10 +4875,7 @@
             <a:normAutofit/>
           </a:bodyPr>
           <a:p>
-            <a:endParaRPr b="0" lang="pt-BR" sz="1800" spc="-1" strike="noStrike">
-              <a:solidFill>
-                <a:srgbClr val="000000"/>
-              </a:solidFill>
+            <a:endParaRPr b="0" lang="pt-BR" sz="3200" spc="-1" strike="noStrike">
               <a:latin typeface="Arial"/>
             </a:endParaRPr>
           </a:p>
@@ -5110,10 +4925,8 @@
         <p:txBody>
           <a:bodyPr lIns="0" rIns="0" tIns="0" bIns="0" anchor="ctr"/>
           <a:p>
-            <a:endParaRPr b="0" lang="pt-BR" sz="1800" spc="-1" strike="noStrike">
-              <a:solidFill>
-                <a:srgbClr val="000000"/>
-              </a:solidFill>
+            <a:pPr algn="ctr"/>
+            <a:endParaRPr b="0" lang="pt-BR" sz="4400" spc="-1" strike="noStrike">
               <a:latin typeface="Arial"/>
             </a:endParaRPr>
           </a:p>
@@ -5143,10 +4956,7 @@
             <a:normAutofit/>
           </a:bodyPr>
           <a:p>
-            <a:endParaRPr b="0" lang="pt-BR" sz="1800" spc="-1" strike="noStrike">
-              <a:solidFill>
-                <a:srgbClr val="000000"/>
-              </a:solidFill>
+            <a:endParaRPr b="0" lang="pt-BR" sz="3200" spc="-1" strike="noStrike">
               <a:latin typeface="Arial"/>
             </a:endParaRPr>
           </a:p>
@@ -5176,10 +4986,7 @@
             <a:normAutofit/>
           </a:bodyPr>
           <a:p>
-            <a:endParaRPr b="0" lang="pt-BR" sz="1800" spc="-1" strike="noStrike">
-              <a:solidFill>
-                <a:srgbClr val="000000"/>
-              </a:solidFill>
+            <a:endParaRPr b="0" lang="pt-BR" sz="3200" spc="-1" strike="noStrike">
               <a:latin typeface="Arial"/>
             </a:endParaRPr>
           </a:p>
@@ -5209,10 +5016,7 @@
             <a:normAutofit/>
           </a:bodyPr>
           <a:p>
-            <a:endParaRPr b="0" lang="pt-BR" sz="1800" spc="-1" strike="noStrike">
-              <a:solidFill>
-                <a:srgbClr val="000000"/>
-              </a:solidFill>
+            <a:endParaRPr b="0" lang="pt-BR" sz="3200" spc="-1" strike="noStrike">
               <a:latin typeface="Arial"/>
             </a:endParaRPr>
           </a:p>
@@ -5262,10 +5066,8 @@
         <p:txBody>
           <a:bodyPr lIns="0" rIns="0" tIns="0" bIns="0" anchor="ctr"/>
           <a:p>
-            <a:endParaRPr b="0" lang="pt-BR" sz="1800" spc="-1" strike="noStrike">
-              <a:solidFill>
-                <a:srgbClr val="000000"/>
-              </a:solidFill>
+            <a:pPr algn="ctr"/>
+            <a:endParaRPr b="0" lang="pt-BR" sz="4400" spc="-1" strike="noStrike">
               <a:latin typeface="Arial"/>
             </a:endParaRPr>
           </a:p>
@@ -5295,10 +5097,7 @@
             <a:normAutofit/>
           </a:bodyPr>
           <a:p>
-            <a:endParaRPr b="0" lang="pt-BR" sz="1800" spc="-1" strike="noStrike">
-              <a:solidFill>
-                <a:srgbClr val="000000"/>
-              </a:solidFill>
+            <a:endParaRPr b="0" lang="pt-BR" sz="3200" spc="-1" strike="noStrike">
               <a:latin typeface="Arial"/>
             </a:endParaRPr>
           </a:p>
@@ -5328,10 +5127,7 @@
             <a:normAutofit/>
           </a:bodyPr>
           <a:p>
-            <a:endParaRPr b="0" lang="pt-BR" sz="1800" spc="-1" strike="noStrike">
-              <a:solidFill>
-                <a:srgbClr val="000000"/>
-              </a:solidFill>
+            <a:endParaRPr b="0" lang="pt-BR" sz="3200" spc="-1" strike="noStrike">
               <a:latin typeface="Arial"/>
             </a:endParaRPr>
           </a:p>
@@ -5381,10 +5177,8 @@
         <p:txBody>
           <a:bodyPr lIns="0" rIns="0" tIns="0" bIns="0" anchor="ctr"/>
           <a:p>
-            <a:endParaRPr b="0" lang="pt-BR" sz="1800" spc="-1" strike="noStrike">
-              <a:solidFill>
-                <a:srgbClr val="000000"/>
-              </a:solidFill>
+            <a:pPr algn="ctr"/>
+            <a:endParaRPr b="0" lang="pt-BR" sz="4400" spc="-1" strike="noStrike">
               <a:latin typeface="Arial"/>
             </a:endParaRPr>
           </a:p>
@@ -5414,10 +5208,7 @@
             <a:normAutofit/>
           </a:bodyPr>
           <a:p>
-            <a:endParaRPr b="0" lang="pt-BR" sz="1800" spc="-1" strike="noStrike">
-              <a:solidFill>
-                <a:srgbClr val="000000"/>
-              </a:solidFill>
+            <a:endParaRPr b="0" lang="pt-BR" sz="3200" spc="-1" strike="noStrike">
               <a:latin typeface="Arial"/>
             </a:endParaRPr>
           </a:p>
@@ -5447,10 +5238,7 @@
             <a:normAutofit/>
           </a:bodyPr>
           <a:p>
-            <a:endParaRPr b="0" lang="pt-BR" sz="1800" spc="-1" strike="noStrike">
-              <a:solidFill>
-                <a:srgbClr val="000000"/>
-              </a:solidFill>
+            <a:endParaRPr b="0" lang="pt-BR" sz="3200" spc="-1" strike="noStrike">
               <a:latin typeface="Arial"/>
             </a:endParaRPr>
           </a:p>
@@ -5480,10 +5268,7 @@
             <a:normAutofit/>
           </a:bodyPr>
           <a:p>
-            <a:endParaRPr b="0" lang="pt-BR" sz="1800" spc="-1" strike="noStrike">
-              <a:solidFill>
-                <a:srgbClr val="000000"/>
-              </a:solidFill>
+            <a:endParaRPr b="0" lang="pt-BR" sz="3200" spc="-1" strike="noStrike">
               <a:latin typeface="Arial"/>
             </a:endParaRPr>
           </a:p>
@@ -5513,10 +5298,7 @@
             <a:normAutofit/>
           </a:bodyPr>
           <a:p>
-            <a:endParaRPr b="0" lang="pt-BR" sz="1800" spc="-1" strike="noStrike">
-              <a:solidFill>
-                <a:srgbClr val="000000"/>
-              </a:solidFill>
+            <a:endParaRPr b="0" lang="pt-BR" sz="3200" spc="-1" strike="noStrike">
               <a:latin typeface="Arial"/>
             </a:endParaRPr>
           </a:p>
@@ -5566,10 +5348,8 @@
         <p:txBody>
           <a:bodyPr lIns="0" rIns="0" tIns="0" bIns="0" anchor="ctr"/>
           <a:p>
-            <a:endParaRPr b="0" lang="pt-BR" sz="1800" spc="-1" strike="noStrike">
-              <a:solidFill>
-                <a:srgbClr val="000000"/>
-              </a:solidFill>
+            <a:pPr algn="ctr"/>
+            <a:endParaRPr b="0" lang="pt-BR" sz="4400" spc="-1" strike="noStrike">
               <a:latin typeface="Arial"/>
             </a:endParaRPr>
           </a:p>
@@ -5599,10 +5379,7 @@
             <a:normAutofit/>
           </a:bodyPr>
           <a:p>
-            <a:endParaRPr b="0" lang="pt-BR" sz="1800" spc="-1" strike="noStrike">
-              <a:solidFill>
-                <a:srgbClr val="000000"/>
-              </a:solidFill>
+            <a:endParaRPr b="0" lang="pt-BR" sz="3200" spc="-1" strike="noStrike">
               <a:latin typeface="Arial"/>
             </a:endParaRPr>
           </a:p>
@@ -5632,10 +5409,7 @@
             <a:normAutofit/>
           </a:bodyPr>
           <a:p>
-            <a:endParaRPr b="0" lang="pt-BR" sz="1800" spc="-1" strike="noStrike">
-              <a:solidFill>
-                <a:srgbClr val="000000"/>
-              </a:solidFill>
+            <a:endParaRPr b="0" lang="pt-BR" sz="3200" spc="-1" strike="noStrike">
               <a:latin typeface="Arial"/>
             </a:endParaRPr>
           </a:p>
@@ -5665,10 +5439,7 @@
             <a:normAutofit/>
           </a:bodyPr>
           <a:p>
-            <a:endParaRPr b="0" lang="pt-BR" sz="1800" spc="-1" strike="noStrike">
-              <a:solidFill>
-                <a:srgbClr val="000000"/>
-              </a:solidFill>
+            <a:endParaRPr b="0" lang="pt-BR" sz="3200" spc="-1" strike="noStrike">
               <a:latin typeface="Arial"/>
             </a:endParaRPr>
           </a:p>
@@ -5698,10 +5469,7 @@
             <a:normAutofit/>
           </a:bodyPr>
           <a:p>
-            <a:endParaRPr b="0" lang="pt-BR" sz="1800" spc="-1" strike="noStrike">
-              <a:solidFill>
-                <a:srgbClr val="000000"/>
-              </a:solidFill>
+            <a:endParaRPr b="0" lang="pt-BR" sz="3200" spc="-1" strike="noStrike">
               <a:latin typeface="Arial"/>
             </a:endParaRPr>
           </a:p>
@@ -5731,10 +5499,7 @@
             <a:normAutofit/>
           </a:bodyPr>
           <a:p>
-            <a:endParaRPr b="0" lang="pt-BR" sz="1800" spc="-1" strike="noStrike">
-              <a:solidFill>
-                <a:srgbClr val="000000"/>
-              </a:solidFill>
+            <a:endParaRPr b="0" lang="pt-BR" sz="3200" spc="-1" strike="noStrike">
               <a:latin typeface="Arial"/>
             </a:endParaRPr>
           </a:p>
@@ -5764,10 +5529,7 @@
             <a:normAutofit/>
           </a:bodyPr>
           <a:p>
-            <a:endParaRPr b="0" lang="pt-BR" sz="1800" spc="-1" strike="noStrike">
-              <a:solidFill>
-                <a:srgbClr val="000000"/>
-              </a:solidFill>
+            <a:endParaRPr b="0" lang="pt-BR" sz="3200" spc="-1" strike="noStrike">
               <a:latin typeface="Arial"/>
             </a:endParaRPr>
           </a:p>
@@ -5817,10 +5579,8 @@
         <p:txBody>
           <a:bodyPr lIns="0" rIns="0" tIns="0" bIns="0" anchor="ctr"/>
           <a:p>
-            <a:endParaRPr b="0" lang="pt-BR" sz="1800" spc="-1" strike="noStrike">
-              <a:solidFill>
-                <a:srgbClr val="000000"/>
-              </a:solidFill>
+            <a:pPr algn="ctr"/>
+            <a:endParaRPr b="0" lang="pt-BR" sz="4400" spc="-1" strike="noStrike">
               <a:latin typeface="Arial"/>
             </a:endParaRPr>
           </a:p>
@@ -5850,10 +5610,7 @@
             <a:normAutofit/>
           </a:bodyPr>
           <a:p>
-            <a:endParaRPr b="0" lang="pt-BR" sz="1800" spc="-1" strike="noStrike">
-              <a:solidFill>
-                <a:srgbClr val="000000"/>
-              </a:solidFill>
+            <a:endParaRPr b="0" lang="pt-BR" sz="3200" spc="-1" strike="noStrike">
               <a:latin typeface="Arial"/>
             </a:endParaRPr>
           </a:p>
@@ -5883,10 +5640,7 @@
             <a:normAutofit/>
           </a:bodyPr>
           <a:p>
-            <a:endParaRPr b="0" lang="pt-BR" sz="1800" spc="-1" strike="noStrike">
-              <a:solidFill>
-                <a:srgbClr val="000000"/>
-              </a:solidFill>
+            <a:endParaRPr b="0" lang="pt-BR" sz="3200" spc="-1" strike="noStrike">
               <a:latin typeface="Arial"/>
             </a:endParaRPr>
           </a:p>
@@ -5936,10 +5690,8 @@
         <p:txBody>
           <a:bodyPr lIns="0" rIns="0" tIns="0" bIns="0" anchor="ctr"/>
           <a:p>
-            <a:endParaRPr b="0" lang="pt-BR" sz="1800" spc="-1" strike="noStrike">
-              <a:solidFill>
-                <a:srgbClr val="000000"/>
-              </a:solidFill>
+            <a:pPr algn="ctr"/>
+            <a:endParaRPr b="0" lang="pt-BR" sz="4400" spc="-1" strike="noStrike">
               <a:latin typeface="Arial"/>
             </a:endParaRPr>
           </a:p>
@@ -6040,10 +5792,8 @@
         <p:txBody>
           <a:bodyPr lIns="0" rIns="0" tIns="0" bIns="0" anchor="ctr"/>
           <a:p>
-            <a:endParaRPr b="0" lang="pt-BR" sz="1800" spc="-1" strike="noStrike">
-              <a:solidFill>
-                <a:srgbClr val="000000"/>
-              </a:solidFill>
+            <a:pPr algn="ctr"/>
+            <a:endParaRPr b="0" lang="pt-BR" sz="4400" spc="-1" strike="noStrike">
               <a:latin typeface="Arial"/>
             </a:endParaRPr>
           </a:p>
@@ -6073,10 +5823,7 @@
             <a:normAutofit/>
           </a:bodyPr>
           <a:p>
-            <a:endParaRPr b="0" lang="pt-BR" sz="1800" spc="-1" strike="noStrike">
-              <a:solidFill>
-                <a:srgbClr val="000000"/>
-              </a:solidFill>
+            <a:endParaRPr b="0" lang="pt-BR" sz="3200" spc="-1" strike="noStrike">
               <a:latin typeface="Arial"/>
             </a:endParaRPr>
           </a:p>
@@ -6106,10 +5853,7 @@
             <a:normAutofit/>
           </a:bodyPr>
           <a:p>
-            <a:endParaRPr b="0" lang="pt-BR" sz="1800" spc="-1" strike="noStrike">
-              <a:solidFill>
-                <a:srgbClr val="000000"/>
-              </a:solidFill>
+            <a:endParaRPr b="0" lang="pt-BR" sz="3200" spc="-1" strike="noStrike">
               <a:latin typeface="Arial"/>
             </a:endParaRPr>
           </a:p>
@@ -6139,10 +5883,7 @@
             <a:normAutofit/>
           </a:bodyPr>
           <a:p>
-            <a:endParaRPr b="0" lang="pt-BR" sz="1800" spc="-1" strike="noStrike">
-              <a:solidFill>
-                <a:srgbClr val="000000"/>
-              </a:solidFill>
+            <a:endParaRPr b="0" lang="pt-BR" sz="3200" spc="-1" strike="noStrike">
               <a:latin typeface="Arial"/>
             </a:endParaRPr>
           </a:p>
@@ -6192,10 +5933,8 @@
         <p:txBody>
           <a:bodyPr lIns="0" rIns="0" tIns="0" bIns="0" anchor="ctr"/>
           <a:p>
-            <a:endParaRPr b="0" lang="pt-BR" sz="1800" spc="-1" strike="noStrike">
-              <a:solidFill>
-                <a:srgbClr val="000000"/>
-              </a:solidFill>
+            <a:pPr algn="ctr"/>
+            <a:endParaRPr b="0" lang="pt-BR" sz="4400" spc="-1" strike="noStrike">
               <a:latin typeface="Arial"/>
             </a:endParaRPr>
           </a:p>
@@ -6225,10 +5964,7 @@
             <a:normAutofit/>
           </a:bodyPr>
           <a:p>
-            <a:endParaRPr b="0" lang="pt-BR" sz="1800" spc="-1" strike="noStrike">
-              <a:solidFill>
-                <a:srgbClr val="000000"/>
-              </a:solidFill>
+            <a:endParaRPr b="0" lang="pt-BR" sz="3200" spc="-1" strike="noStrike">
               <a:latin typeface="Arial"/>
             </a:endParaRPr>
           </a:p>
@@ -6258,10 +5994,7 @@
             <a:normAutofit/>
           </a:bodyPr>
           <a:p>
-            <a:endParaRPr b="0" lang="pt-BR" sz="1800" spc="-1" strike="noStrike">
-              <a:solidFill>
-                <a:srgbClr val="000000"/>
-              </a:solidFill>
+            <a:endParaRPr b="0" lang="pt-BR" sz="3200" spc="-1" strike="noStrike">
               <a:latin typeface="Arial"/>
             </a:endParaRPr>
           </a:p>
@@ -6291,10 +6024,7 @@
             <a:normAutofit/>
           </a:bodyPr>
           <a:p>
-            <a:endParaRPr b="0" lang="pt-BR" sz="1800" spc="-1" strike="noStrike">
-              <a:solidFill>
-                <a:srgbClr val="000000"/>
-              </a:solidFill>
+            <a:endParaRPr b="0" lang="pt-BR" sz="3200" spc="-1" strike="noStrike">
               <a:latin typeface="Arial"/>
             </a:endParaRPr>
           </a:p>
@@ -6344,10 +6074,8 @@
         <p:txBody>
           <a:bodyPr lIns="0" rIns="0" tIns="0" bIns="0" anchor="ctr"/>
           <a:p>
-            <a:endParaRPr b="0" lang="pt-BR" sz="1800" spc="-1" strike="noStrike">
-              <a:solidFill>
-                <a:srgbClr val="000000"/>
-              </a:solidFill>
+            <a:pPr algn="ctr"/>
+            <a:endParaRPr b="0" lang="pt-BR" sz="4400" spc="-1" strike="noStrike">
               <a:latin typeface="Arial"/>
             </a:endParaRPr>
           </a:p>
@@ -6377,10 +6105,7 @@
             <a:normAutofit/>
           </a:bodyPr>
           <a:p>
-            <a:endParaRPr b="0" lang="pt-BR" sz="1800" spc="-1" strike="noStrike">
-              <a:solidFill>
-                <a:srgbClr val="000000"/>
-              </a:solidFill>
+            <a:endParaRPr b="0" lang="pt-BR" sz="3200" spc="-1" strike="noStrike">
               <a:latin typeface="Arial"/>
             </a:endParaRPr>
           </a:p>
@@ -6410,10 +6135,7 @@
             <a:normAutofit/>
           </a:bodyPr>
           <a:p>
-            <a:endParaRPr b="0" lang="pt-BR" sz="1800" spc="-1" strike="noStrike">
-              <a:solidFill>
-                <a:srgbClr val="000000"/>
-              </a:solidFill>
+            <a:endParaRPr b="0" lang="pt-BR" sz="3200" spc="-1" strike="noStrike">
               <a:latin typeface="Arial"/>
             </a:endParaRPr>
           </a:p>
@@ -6443,10 +6165,7 @@
             <a:normAutofit/>
           </a:bodyPr>
           <a:p>
-            <a:endParaRPr b="0" lang="pt-BR" sz="1800" spc="-1" strike="noStrike">
-              <a:solidFill>
-                <a:srgbClr val="000000"/>
-              </a:solidFill>
+            <a:endParaRPr b="0" lang="pt-BR" sz="3200" spc="-1" strike="noStrike">
               <a:latin typeface="Arial"/>
             </a:endParaRPr>
           </a:p>
@@ -6489,13 +6208,13 @@
         </p:nvPicPr>
         <p:blipFill>
           <a:blip r:embed="rId2"/>
-          <a:srcRect l="0" t="87251" r="0" b="0"/>
+          <a:srcRect l="0" t="87237" r="0" b="0"/>
           <a:stretch/>
         </p:blipFill>
         <p:spPr>
           <a:xfrm>
             <a:off x="0" y="5985000"/>
-            <a:ext cx="12178440" cy="872280"/>
+            <a:ext cx="12178080" cy="871920"/>
           </a:xfrm>
           <a:prstGeom prst="rect">
             <a:avLst/>
@@ -6517,8 +6236,8 @@
         </p:nvSpPr>
         <p:spPr>
           <a:xfrm>
-            <a:off x="5567040" y="4055400"/>
-            <a:ext cx="6147000" cy="2386800"/>
+            <a:off x="609480" y="273600"/>
+            <a:ext cx="10972080" cy="1144440"/>
           </a:xfrm>
           <a:prstGeom prst="rect">
             <a:avLst/>
@@ -6529,17 +6248,11 @@
           <a:p>
             <a:r>
               <a:rPr b="0" lang="pt-BR" sz="1800" spc="-1" strike="noStrike">
-                <a:solidFill>
-                  <a:srgbClr val="000000"/>
-                </a:solidFill>
                 <a:latin typeface="Arial"/>
               </a:rPr>
               <a:t>Click to edit the title text format</a:t>
             </a:r>
             <a:endParaRPr b="0" lang="pt-BR" sz="1800" spc="-1" strike="noStrike">
-              <a:solidFill>
-                <a:srgbClr val="000000"/>
-              </a:solidFill>
               <a:latin typeface="Arial"/>
             </a:endParaRPr>
           </a:p>
@@ -6558,7 +6271,7 @@
         <p:spPr>
           <a:xfrm>
             <a:off x="609480" y="1604520"/>
-            <a:ext cx="10972440" cy="3977280"/>
+            <a:ext cx="10972080" cy="3976920"/>
           </a:xfrm>
           <a:prstGeom prst="rect">
             <a:avLst/>
@@ -6582,17 +6295,11 @@
             </a:pPr>
             <a:r>
               <a:rPr b="0" lang="pt-BR" sz="1800" spc="-1" strike="noStrike">
-                <a:solidFill>
-                  <a:srgbClr val="000000"/>
-                </a:solidFill>
                 <a:latin typeface="Arial"/>
               </a:rPr>
               <a:t>Click to edit the outline text format</a:t>
             </a:r>
             <a:endParaRPr b="0" lang="pt-BR" sz="1800" spc="-1" strike="noStrike">
-              <a:solidFill>
-                <a:srgbClr val="000000"/>
-              </a:solidFill>
               <a:latin typeface="Arial"/>
             </a:endParaRPr>
           </a:p>
@@ -6610,17 +6317,11 @@
             </a:pPr>
             <a:r>
               <a:rPr b="0" lang="pt-BR" sz="1800" spc="-1" strike="noStrike">
-                <a:solidFill>
-                  <a:srgbClr val="000000"/>
-                </a:solidFill>
                 <a:latin typeface="Arial"/>
               </a:rPr>
               <a:t>Second Outline Level</a:t>
             </a:r>
             <a:endParaRPr b="0" lang="pt-BR" sz="1800" spc="-1" strike="noStrike">
-              <a:solidFill>
-                <a:srgbClr val="000000"/>
-              </a:solidFill>
               <a:latin typeface="Arial"/>
             </a:endParaRPr>
           </a:p>
@@ -6638,17 +6339,11 @@
             </a:pPr>
             <a:r>
               <a:rPr b="0" lang="pt-BR" sz="1800" spc="-1" strike="noStrike">
-                <a:solidFill>
-                  <a:srgbClr val="000000"/>
-                </a:solidFill>
                 <a:latin typeface="Arial"/>
               </a:rPr>
               <a:t>Third Outline Level</a:t>
             </a:r>
             <a:endParaRPr b="0" lang="pt-BR" sz="1800" spc="-1" strike="noStrike">
-              <a:solidFill>
-                <a:srgbClr val="000000"/>
-              </a:solidFill>
               <a:latin typeface="Arial"/>
             </a:endParaRPr>
           </a:p>
@@ -6666,17 +6361,11 @@
             </a:pPr>
             <a:r>
               <a:rPr b="0" lang="pt-BR" sz="1800" spc="-1" strike="noStrike">
-                <a:solidFill>
-                  <a:srgbClr val="000000"/>
-                </a:solidFill>
                 <a:latin typeface="Arial"/>
               </a:rPr>
               <a:t>Fourth Outline Level</a:t>
             </a:r>
             <a:endParaRPr b="0" lang="pt-BR" sz="1800" spc="-1" strike="noStrike">
-              <a:solidFill>
-                <a:srgbClr val="000000"/>
-              </a:solidFill>
               <a:latin typeface="Arial"/>
             </a:endParaRPr>
           </a:p>
@@ -6693,18 +6382,12 @@
               <a:buChar char=""/>
             </a:pPr>
             <a:r>
-              <a:rPr b="0" lang="pt-BR" sz="2000" spc="-1" strike="noStrike">
-                <a:solidFill>
-                  <a:srgbClr val="000000"/>
-                </a:solidFill>
+              <a:rPr b="0" lang="pt-BR" sz="1800" spc="-1" strike="noStrike">
                 <a:latin typeface="Arial"/>
               </a:rPr>
               <a:t>Fifth Outline Level</a:t>
             </a:r>
-            <a:endParaRPr b="0" lang="pt-BR" sz="2000" spc="-1" strike="noStrike">
-              <a:solidFill>
-                <a:srgbClr val="000000"/>
-              </a:solidFill>
+            <a:endParaRPr b="0" lang="pt-BR" sz="1800" spc="-1" strike="noStrike">
               <a:latin typeface="Arial"/>
             </a:endParaRPr>
           </a:p>
@@ -6721,18 +6404,12 @@
               <a:buChar char=""/>
             </a:pPr>
             <a:r>
-              <a:rPr b="0" lang="pt-BR" sz="2000" spc="-1" strike="noStrike">
-                <a:solidFill>
-                  <a:srgbClr val="000000"/>
-                </a:solidFill>
+              <a:rPr b="0" lang="pt-BR" sz="1800" spc="-1" strike="noStrike">
                 <a:latin typeface="Arial"/>
               </a:rPr>
               <a:t>Sixth Outline Level</a:t>
             </a:r>
-            <a:endParaRPr b="0" lang="pt-BR" sz="2000" spc="-1" strike="noStrike">
-              <a:solidFill>
-                <a:srgbClr val="000000"/>
-              </a:solidFill>
+            <a:endParaRPr b="0" lang="pt-BR" sz="1800" spc="-1" strike="noStrike">
               <a:latin typeface="Arial"/>
             </a:endParaRPr>
           </a:p>
@@ -6749,18 +6426,12 @@
               <a:buChar char=""/>
             </a:pPr>
             <a:r>
-              <a:rPr b="0" lang="pt-BR" sz="2000" spc="-1" strike="noStrike">
-                <a:solidFill>
-                  <a:srgbClr val="000000"/>
-                </a:solidFill>
+              <a:rPr b="0" lang="pt-BR" sz="1800" spc="-1" strike="noStrike">
                 <a:latin typeface="Arial"/>
               </a:rPr>
               <a:t>Seventh Outline Level</a:t>
             </a:r>
-            <a:endParaRPr b="0" lang="pt-BR" sz="2000" spc="-1" strike="noStrike">
-              <a:solidFill>
-                <a:srgbClr val="000000"/>
-              </a:solidFill>
+            <a:endParaRPr b="0" lang="pt-BR" sz="1800" spc="-1" strike="noStrike">
               <a:latin typeface="Arial"/>
             </a:endParaRPr>
           </a:p>
@@ -6818,13 +6489,13 @@
         </p:nvPicPr>
         <p:blipFill>
           <a:blip r:embed="rId2"/>
-          <a:srcRect l="0" t="87251" r="0" b="0"/>
+          <a:srcRect l="0" t="87237" r="0" b="0"/>
           <a:stretch/>
         </p:blipFill>
         <p:spPr>
           <a:xfrm>
             <a:off x="0" y="5985000"/>
-            <a:ext cx="12178440" cy="872280"/>
+            <a:ext cx="12178080" cy="871920"/>
           </a:xfrm>
           <a:prstGeom prst="rect">
             <a:avLst/>
@@ -6856,235 +6527,14 @@
         <p:txBody>
           <a:bodyPr lIns="0" rIns="0" tIns="0" bIns="0" anchor="ctr"/>
           <a:p>
+            <a:pPr algn="ctr"/>
             <a:r>
-              <a:rPr b="0" lang="pt-BR" sz="1800" spc="-1" strike="noStrike">
-                <a:solidFill>
-                  <a:srgbClr val="000000"/>
-                </a:solidFill>
+              <a:rPr b="0" lang="pt-BR" sz="4400" spc="-1" strike="noStrike">
                 <a:latin typeface="Arial"/>
               </a:rPr>
-              <a:t>C</a:t>
+              <a:t>Click to edit the title text format</a:t>
             </a:r>
-            <a:r>
-              <a:rPr b="0" lang="pt-BR" sz="1800" spc="-1" strike="noStrike">
-                <a:solidFill>
-                  <a:srgbClr val="000000"/>
-                </a:solidFill>
-                <a:latin typeface="Arial"/>
-              </a:rPr>
-              <a:t>li</a:t>
-            </a:r>
-            <a:r>
-              <a:rPr b="0" lang="pt-BR" sz="1800" spc="-1" strike="noStrike">
-                <a:solidFill>
-                  <a:srgbClr val="000000"/>
-                </a:solidFill>
-                <a:latin typeface="Arial"/>
-              </a:rPr>
-              <a:t>c</a:t>
-            </a:r>
-            <a:r>
-              <a:rPr b="0" lang="pt-BR" sz="1800" spc="-1" strike="noStrike">
-                <a:solidFill>
-                  <a:srgbClr val="000000"/>
-                </a:solidFill>
-                <a:latin typeface="Arial"/>
-              </a:rPr>
-              <a:t>k </a:t>
-            </a:r>
-            <a:r>
-              <a:rPr b="0" lang="pt-BR" sz="1800" spc="-1" strike="noStrike">
-                <a:solidFill>
-                  <a:srgbClr val="000000"/>
-                </a:solidFill>
-                <a:latin typeface="Arial"/>
-              </a:rPr>
-              <a:t>t</a:t>
-            </a:r>
-            <a:r>
-              <a:rPr b="0" lang="pt-BR" sz="1800" spc="-1" strike="noStrike">
-                <a:solidFill>
-                  <a:srgbClr val="000000"/>
-                </a:solidFill>
-                <a:latin typeface="Arial"/>
-              </a:rPr>
-              <a:t>o </a:t>
-            </a:r>
-            <a:r>
-              <a:rPr b="0" lang="pt-BR" sz="1800" spc="-1" strike="noStrike">
-                <a:solidFill>
-                  <a:srgbClr val="000000"/>
-                </a:solidFill>
-                <a:latin typeface="Arial"/>
-              </a:rPr>
-              <a:t>e</a:t>
-            </a:r>
-            <a:r>
-              <a:rPr b="0" lang="pt-BR" sz="1800" spc="-1" strike="noStrike">
-                <a:solidFill>
-                  <a:srgbClr val="000000"/>
-                </a:solidFill>
-                <a:latin typeface="Arial"/>
-              </a:rPr>
-              <a:t>d</a:t>
-            </a:r>
-            <a:r>
-              <a:rPr b="0" lang="pt-BR" sz="1800" spc="-1" strike="noStrike">
-                <a:solidFill>
-                  <a:srgbClr val="000000"/>
-                </a:solidFill>
-                <a:latin typeface="Arial"/>
-              </a:rPr>
-              <a:t>it </a:t>
-            </a:r>
-            <a:r>
-              <a:rPr b="0" lang="pt-BR" sz="1800" spc="-1" strike="noStrike">
-                <a:solidFill>
-                  <a:srgbClr val="000000"/>
-                </a:solidFill>
-                <a:latin typeface="Arial"/>
-              </a:rPr>
-              <a:t>t</a:t>
-            </a:r>
-            <a:r>
-              <a:rPr b="0" lang="pt-BR" sz="1800" spc="-1" strike="noStrike">
-                <a:solidFill>
-                  <a:srgbClr val="000000"/>
-                </a:solidFill>
-                <a:latin typeface="Arial"/>
-              </a:rPr>
-              <a:t>h</a:t>
-            </a:r>
-            <a:r>
-              <a:rPr b="0" lang="pt-BR" sz="1800" spc="-1" strike="noStrike">
-                <a:solidFill>
-                  <a:srgbClr val="000000"/>
-                </a:solidFill>
-                <a:latin typeface="Arial"/>
-              </a:rPr>
-              <a:t>e </a:t>
-            </a:r>
-            <a:r>
-              <a:rPr b="0" lang="pt-BR" sz="1800" spc="-1" strike="noStrike">
-                <a:solidFill>
-                  <a:srgbClr val="000000"/>
-                </a:solidFill>
-                <a:latin typeface="Arial"/>
-              </a:rPr>
-              <a:t>ti</a:t>
-            </a:r>
-            <a:r>
-              <a:rPr b="0" lang="pt-BR" sz="1800" spc="-1" strike="noStrike">
-                <a:solidFill>
-                  <a:srgbClr val="000000"/>
-                </a:solidFill>
-                <a:latin typeface="Arial"/>
-              </a:rPr>
-              <a:t>tl</a:t>
-            </a:r>
-            <a:r>
-              <a:rPr b="0" lang="pt-BR" sz="1800" spc="-1" strike="noStrike">
-                <a:solidFill>
-                  <a:srgbClr val="000000"/>
-                </a:solidFill>
-                <a:latin typeface="Arial"/>
-              </a:rPr>
-              <a:t>e </a:t>
-            </a:r>
-            <a:r>
-              <a:rPr b="0" lang="pt-BR" sz="1800" spc="-1" strike="noStrike">
-                <a:solidFill>
-                  <a:srgbClr val="000000"/>
-                </a:solidFill>
-                <a:latin typeface="Arial"/>
-              </a:rPr>
-              <a:t>t</a:t>
-            </a:r>
-            <a:r>
-              <a:rPr b="0" lang="pt-BR" sz="1800" spc="-1" strike="noStrike">
-                <a:solidFill>
-                  <a:srgbClr val="000000"/>
-                </a:solidFill>
-                <a:latin typeface="Arial"/>
-              </a:rPr>
-              <a:t>e</a:t>
-            </a:r>
-            <a:r>
-              <a:rPr b="0" lang="pt-BR" sz="1800" spc="-1" strike="noStrike">
-                <a:solidFill>
-                  <a:srgbClr val="000000"/>
-                </a:solidFill>
-                <a:latin typeface="Arial"/>
-              </a:rPr>
-              <a:t>x</a:t>
-            </a:r>
-            <a:r>
-              <a:rPr b="0" lang="pt-BR" sz="1800" spc="-1" strike="noStrike">
-                <a:solidFill>
-                  <a:srgbClr val="000000"/>
-                </a:solidFill>
-                <a:latin typeface="Arial"/>
-              </a:rPr>
-              <a:t>t </a:t>
-            </a:r>
-            <a:r>
-              <a:rPr b="0" lang="pt-BR" sz="1800" spc="-1" strike="noStrike">
-                <a:solidFill>
-                  <a:srgbClr val="000000"/>
-                </a:solidFill>
-                <a:latin typeface="Arial"/>
-              </a:rPr>
-              <a:t>f</a:t>
-            </a:r>
-            <a:r>
-              <a:rPr b="0" lang="pt-BR" sz="1800" spc="-1" strike="noStrike">
-                <a:solidFill>
-                  <a:srgbClr val="000000"/>
-                </a:solidFill>
-                <a:latin typeface="Arial"/>
-              </a:rPr>
-              <a:t>o</a:t>
-            </a:r>
-            <a:r>
-              <a:rPr b="0" lang="pt-BR" sz="1800" spc="-1" strike="noStrike">
-                <a:solidFill>
-                  <a:srgbClr val="000000"/>
-                </a:solidFill>
-                <a:latin typeface="Arial"/>
-              </a:rPr>
-              <a:t>r</a:t>
-            </a:r>
-            <a:r>
-              <a:rPr b="0" lang="pt-BR" sz="1800" spc="-1" strike="noStrike">
-                <a:solidFill>
-                  <a:srgbClr val="000000"/>
-                </a:solidFill>
-                <a:latin typeface="Arial"/>
-              </a:rPr>
-              <a:t>m</a:t>
-            </a:r>
-            <a:r>
-              <a:rPr b="0" lang="pt-BR" sz="1800" spc="-1" strike="noStrike">
-                <a:solidFill>
-                  <a:srgbClr val="000000"/>
-                </a:solidFill>
-                <a:latin typeface="Arial"/>
-              </a:rPr>
-              <a:t>a</a:t>
-            </a:r>
-            <a:r>
-              <a:rPr b="0" lang="pt-BR" sz="1800" spc="-1" strike="noStrike">
-                <a:solidFill>
-                  <a:srgbClr val="000000"/>
-                </a:solidFill>
-                <a:latin typeface="Arial"/>
-              </a:rPr>
-              <a:t>t</a:t>
-            </a:r>
-            <a:endParaRPr b="0" lang="pt-BR" sz="1800" spc="-1" strike="noStrike">
-              <a:solidFill>
-                <a:srgbClr val="000000"/>
-              </a:solidFill>
+            <a:endParaRPr b="0" lang="pt-BR" sz="4400" spc="-1" strike="noStrike">
               <a:latin typeface="Arial"/>
             </a:endParaRPr>
           </a:p>
@@ -7126,18 +6576,12 @@
               <a:buChar char=""/>
             </a:pPr>
             <a:r>
-              <a:rPr b="0" lang="pt-BR" sz="1800" spc="-1" strike="noStrike">
-                <a:solidFill>
-                  <a:srgbClr val="000000"/>
-                </a:solidFill>
+              <a:rPr b="0" lang="pt-BR" sz="3200" spc="-1" strike="noStrike">
                 <a:latin typeface="Arial"/>
               </a:rPr>
               <a:t>Click to edit the outline text format</a:t>
             </a:r>
-            <a:endParaRPr b="0" lang="pt-BR" sz="1800" spc="-1" strike="noStrike">
-              <a:solidFill>
-                <a:srgbClr val="000000"/>
-              </a:solidFill>
+            <a:endParaRPr b="0" lang="pt-BR" sz="3200" spc="-1" strike="noStrike">
               <a:latin typeface="Arial"/>
             </a:endParaRPr>
           </a:p>
@@ -7154,18 +6598,12 @@
               <a:buChar char=""/>
             </a:pPr>
             <a:r>
-              <a:rPr b="0" lang="pt-BR" sz="1800" spc="-1" strike="noStrike">
-                <a:solidFill>
-                  <a:srgbClr val="000000"/>
-                </a:solidFill>
+              <a:rPr b="0" lang="pt-BR" sz="2800" spc="-1" strike="noStrike">
                 <a:latin typeface="Arial"/>
               </a:rPr>
               <a:t>Second Outline Level</a:t>
             </a:r>
-            <a:endParaRPr b="0" lang="pt-BR" sz="1800" spc="-1" strike="noStrike">
-              <a:solidFill>
-                <a:srgbClr val="000000"/>
-              </a:solidFill>
+            <a:endParaRPr b="0" lang="pt-BR" sz="2800" spc="-1" strike="noStrike">
               <a:latin typeface="Arial"/>
             </a:endParaRPr>
           </a:p>
@@ -7182,18 +6620,12 @@
               <a:buChar char=""/>
             </a:pPr>
             <a:r>
-              <a:rPr b="0" lang="pt-BR" sz="1800" spc="-1" strike="noStrike">
-                <a:solidFill>
-                  <a:srgbClr val="000000"/>
-                </a:solidFill>
+              <a:rPr b="0" lang="pt-BR" sz="2400" spc="-1" strike="noStrike">
                 <a:latin typeface="Arial"/>
               </a:rPr>
               <a:t>Third Outline Level</a:t>
             </a:r>
-            <a:endParaRPr b="0" lang="pt-BR" sz="1800" spc="-1" strike="noStrike">
-              <a:solidFill>
-                <a:srgbClr val="000000"/>
-              </a:solidFill>
+            <a:endParaRPr b="0" lang="pt-BR" sz="2400" spc="-1" strike="noStrike">
               <a:latin typeface="Arial"/>
             </a:endParaRPr>
           </a:p>
@@ -7210,18 +6642,12 @@
               <a:buChar char=""/>
             </a:pPr>
             <a:r>
-              <a:rPr b="0" lang="pt-BR" sz="1800" spc="-1" strike="noStrike">
-                <a:solidFill>
-                  <a:srgbClr val="000000"/>
-                </a:solidFill>
+              <a:rPr b="0" lang="pt-BR" sz="2000" spc="-1" strike="noStrike">
                 <a:latin typeface="Arial"/>
               </a:rPr>
               <a:t>Fourth Outline Level</a:t>
             </a:r>
-            <a:endParaRPr b="0" lang="pt-BR" sz="1800" spc="-1" strike="noStrike">
-              <a:solidFill>
-                <a:srgbClr val="000000"/>
-              </a:solidFill>
+            <a:endParaRPr b="0" lang="pt-BR" sz="2000" spc="-1" strike="noStrike">
               <a:latin typeface="Arial"/>
             </a:endParaRPr>
           </a:p>
@@ -7239,17 +6665,11 @@
             </a:pPr>
             <a:r>
               <a:rPr b="0" lang="pt-BR" sz="2000" spc="-1" strike="noStrike">
-                <a:solidFill>
-                  <a:srgbClr val="000000"/>
-                </a:solidFill>
                 <a:latin typeface="Arial"/>
               </a:rPr>
               <a:t>Fifth Outline Level</a:t>
             </a:r>
             <a:endParaRPr b="0" lang="pt-BR" sz="2000" spc="-1" strike="noStrike">
-              <a:solidFill>
-                <a:srgbClr val="000000"/>
-              </a:solidFill>
               <a:latin typeface="Arial"/>
             </a:endParaRPr>
           </a:p>
@@ -7267,17 +6687,11 @@
             </a:pPr>
             <a:r>
               <a:rPr b="0" lang="pt-BR" sz="2000" spc="-1" strike="noStrike">
-                <a:solidFill>
-                  <a:srgbClr val="000000"/>
-                </a:solidFill>
                 <a:latin typeface="Arial"/>
               </a:rPr>
               <a:t>Sixth Outline Level</a:t>
             </a:r>
             <a:endParaRPr b="0" lang="pt-BR" sz="2000" spc="-1" strike="noStrike">
-              <a:solidFill>
-                <a:srgbClr val="000000"/>
-              </a:solidFill>
               <a:latin typeface="Arial"/>
             </a:endParaRPr>
           </a:p>
@@ -7295,17 +6709,11 @@
             </a:pPr>
             <a:r>
               <a:rPr b="0" lang="pt-BR" sz="2000" spc="-1" strike="noStrike">
-                <a:solidFill>
-                  <a:srgbClr val="000000"/>
-                </a:solidFill>
                 <a:latin typeface="Arial"/>
               </a:rPr>
               <a:t>Seventh Outline Level</a:t>
             </a:r>
             <a:endParaRPr b="0" lang="pt-BR" sz="2000" spc="-1" strike="noStrike">
-              <a:solidFill>
-                <a:srgbClr val="000000"/>
-              </a:solidFill>
               <a:latin typeface="Arial"/>
             </a:endParaRPr>
           </a:p>
@@ -7363,13 +6771,13 @@
         </p:nvPicPr>
         <p:blipFill>
           <a:blip r:embed="rId2"/>
-          <a:srcRect l="0" t="87251" r="0" b="0"/>
+          <a:srcRect l="0" t="87237" r="0" b="0"/>
           <a:stretch/>
         </p:blipFill>
         <p:spPr>
           <a:xfrm>
             <a:off x="0" y="5985000"/>
-            <a:ext cx="12178440" cy="872280"/>
+            <a:ext cx="12178080" cy="871920"/>
           </a:xfrm>
           <a:prstGeom prst="rect">
             <a:avLst/>
@@ -7392,7 +6800,7 @@
         <p:spPr>
           <a:xfrm>
             <a:off x="0" y="0"/>
-            <a:ext cx="12178440" cy="6857280"/>
+            <a:ext cx="12178080" cy="6856920"/>
           </a:xfrm>
           <a:prstGeom prst="rect">
             <a:avLst/>
@@ -7424,325 +6832,14 @@
         <p:txBody>
           <a:bodyPr lIns="0" rIns="0" tIns="0" bIns="0" anchor="ctr"/>
           <a:p>
+            <a:pPr algn="ctr"/>
             <a:r>
-              <a:rPr b="0" lang="pt-BR" sz="1800" spc="-1" strike="noStrike">
-                <a:solidFill>
-                  <a:srgbClr val="000000"/>
-                </a:solidFill>
+              <a:rPr b="0" lang="pt-BR" sz="4400" spc="-1" strike="noStrike">
                 <a:latin typeface="Arial"/>
               </a:rPr>
-              <a:t>C</a:t>
+              <a:t>Click to edit the title text format</a:t>
             </a:r>
-            <a:r>
-              <a:rPr b="0" lang="pt-BR" sz="1800" spc="-1" strike="noStrike">
-                <a:solidFill>
-                  <a:srgbClr val="000000"/>
-                </a:solidFill>
-                <a:latin typeface="Arial"/>
-              </a:rPr>
-              <a:t>l</a:t>
-            </a:r>
-            <a:r>
-              <a:rPr b="0" lang="pt-BR" sz="1800" spc="-1" strike="noStrike">
-                <a:solidFill>
-                  <a:srgbClr val="000000"/>
-                </a:solidFill>
-                <a:latin typeface="Arial"/>
-              </a:rPr>
-              <a:t>i</a:t>
-            </a:r>
-            <a:r>
-              <a:rPr b="0" lang="pt-BR" sz="1800" spc="-1" strike="noStrike">
-                <a:solidFill>
-                  <a:srgbClr val="000000"/>
-                </a:solidFill>
-                <a:latin typeface="Arial"/>
-              </a:rPr>
-              <a:t>c</a:t>
-            </a:r>
-            <a:r>
-              <a:rPr b="0" lang="pt-BR" sz="1800" spc="-1" strike="noStrike">
-                <a:solidFill>
-                  <a:srgbClr val="000000"/>
-                </a:solidFill>
-                <a:latin typeface="Arial"/>
-              </a:rPr>
-              <a:t>k</a:t>
-            </a:r>
-            <a:r>
-              <a:rPr b="0" lang="pt-BR" sz="1800" spc="-1" strike="noStrike">
-                <a:solidFill>
-                  <a:srgbClr val="000000"/>
-                </a:solidFill>
-                <a:latin typeface="Arial"/>
-              </a:rPr>
-              <a:t> </a:t>
-            </a:r>
-            <a:r>
-              <a:rPr b="0" lang="pt-BR" sz="1800" spc="-1" strike="noStrike">
-                <a:solidFill>
-                  <a:srgbClr val="000000"/>
-                </a:solidFill>
-                <a:latin typeface="Arial"/>
-              </a:rPr>
-              <a:t>t</a:t>
-            </a:r>
-            <a:r>
-              <a:rPr b="0" lang="pt-BR" sz="1800" spc="-1" strike="noStrike">
-                <a:solidFill>
-                  <a:srgbClr val="000000"/>
-                </a:solidFill>
-                <a:latin typeface="Arial"/>
-              </a:rPr>
-              <a:t>o</a:t>
-            </a:r>
-            <a:r>
-              <a:rPr b="0" lang="pt-BR" sz="1800" spc="-1" strike="noStrike">
-                <a:solidFill>
-                  <a:srgbClr val="000000"/>
-                </a:solidFill>
-                <a:latin typeface="Arial"/>
-              </a:rPr>
-              <a:t> </a:t>
-            </a:r>
-            <a:r>
-              <a:rPr b="0" lang="pt-BR" sz="1800" spc="-1" strike="noStrike">
-                <a:solidFill>
-                  <a:srgbClr val="000000"/>
-                </a:solidFill>
-                <a:latin typeface="Arial"/>
-              </a:rPr>
-              <a:t>e</a:t>
-            </a:r>
-            <a:r>
-              <a:rPr b="0" lang="pt-BR" sz="1800" spc="-1" strike="noStrike">
-                <a:solidFill>
-                  <a:srgbClr val="000000"/>
-                </a:solidFill>
-                <a:latin typeface="Arial"/>
-              </a:rPr>
-              <a:t>d</a:t>
-            </a:r>
-            <a:r>
-              <a:rPr b="0" lang="pt-BR" sz="1800" spc="-1" strike="noStrike">
-                <a:solidFill>
-                  <a:srgbClr val="000000"/>
-                </a:solidFill>
-                <a:latin typeface="Arial"/>
-              </a:rPr>
-              <a:t>i</a:t>
-            </a:r>
-            <a:r>
-              <a:rPr b="0" lang="pt-BR" sz="1800" spc="-1" strike="noStrike">
-                <a:solidFill>
-                  <a:srgbClr val="000000"/>
-                </a:solidFill>
-                <a:latin typeface="Arial"/>
-              </a:rPr>
-              <a:t>t</a:t>
-            </a:r>
-            <a:r>
-              <a:rPr b="0" lang="pt-BR" sz="1800" spc="-1" strike="noStrike">
-                <a:solidFill>
-                  <a:srgbClr val="000000"/>
-                </a:solidFill>
-                <a:latin typeface="Arial"/>
-              </a:rPr>
-              <a:t> </a:t>
-            </a:r>
-            <a:r>
-              <a:rPr b="0" lang="pt-BR" sz="1800" spc="-1" strike="noStrike">
-                <a:solidFill>
-                  <a:srgbClr val="000000"/>
-                </a:solidFill>
-                <a:latin typeface="Arial"/>
-              </a:rPr>
-              <a:t>t</a:t>
-            </a:r>
-            <a:r>
-              <a:rPr b="0" lang="pt-BR" sz="1800" spc="-1" strike="noStrike">
-                <a:solidFill>
-                  <a:srgbClr val="000000"/>
-                </a:solidFill>
-                <a:latin typeface="Arial"/>
-              </a:rPr>
-              <a:t>h</a:t>
-            </a:r>
-            <a:r>
-              <a:rPr b="0" lang="pt-BR" sz="1800" spc="-1" strike="noStrike">
-                <a:solidFill>
-                  <a:srgbClr val="000000"/>
-                </a:solidFill>
-                <a:latin typeface="Arial"/>
-              </a:rPr>
-              <a:t>e</a:t>
-            </a:r>
-            <a:r>
-              <a:rPr b="0" lang="pt-BR" sz="1800" spc="-1" strike="noStrike">
-                <a:solidFill>
-                  <a:srgbClr val="000000"/>
-                </a:solidFill>
-                <a:latin typeface="Arial"/>
-              </a:rPr>
-              <a:t> </a:t>
-            </a:r>
-            <a:r>
-              <a:rPr b="0" lang="pt-BR" sz="1800" spc="-1" strike="noStrike">
-                <a:solidFill>
-                  <a:srgbClr val="000000"/>
-                </a:solidFill>
-                <a:latin typeface="Arial"/>
-              </a:rPr>
-              <a:t>t</a:t>
-            </a:r>
-            <a:r>
-              <a:rPr b="0" lang="pt-BR" sz="1800" spc="-1" strike="noStrike">
-                <a:solidFill>
-                  <a:srgbClr val="000000"/>
-                </a:solidFill>
-                <a:latin typeface="Arial"/>
-              </a:rPr>
-              <a:t>i</a:t>
-            </a:r>
-            <a:r>
-              <a:rPr b="0" lang="pt-BR" sz="1800" spc="-1" strike="noStrike">
-                <a:solidFill>
-                  <a:srgbClr val="000000"/>
-                </a:solidFill>
-                <a:latin typeface="Arial"/>
-              </a:rPr>
-              <a:t>t</a:t>
-            </a:r>
-            <a:r>
-              <a:rPr b="0" lang="pt-BR" sz="1800" spc="-1" strike="noStrike">
-                <a:solidFill>
-                  <a:srgbClr val="000000"/>
-                </a:solidFill>
-                <a:latin typeface="Arial"/>
-              </a:rPr>
-              <a:t>l</a:t>
-            </a:r>
-            <a:r>
-              <a:rPr b="0" lang="pt-BR" sz="1800" spc="-1" strike="noStrike">
-                <a:solidFill>
-                  <a:srgbClr val="000000"/>
-                </a:solidFill>
-                <a:latin typeface="Arial"/>
-              </a:rPr>
-              <a:t>e</a:t>
-            </a:r>
-            <a:r>
-              <a:rPr b="0" lang="pt-BR" sz="1800" spc="-1" strike="noStrike">
-                <a:solidFill>
-                  <a:srgbClr val="000000"/>
-                </a:solidFill>
-                <a:latin typeface="Arial"/>
-              </a:rPr>
-              <a:t> </a:t>
-            </a:r>
-            <a:r>
-              <a:rPr b="0" lang="pt-BR" sz="1800" spc="-1" strike="noStrike">
-                <a:solidFill>
-                  <a:srgbClr val="000000"/>
-                </a:solidFill>
-                <a:latin typeface="Arial"/>
-              </a:rPr>
-              <a:t>t</a:t>
-            </a:r>
-            <a:r>
-              <a:rPr b="0" lang="pt-BR" sz="1800" spc="-1" strike="noStrike">
-                <a:solidFill>
-                  <a:srgbClr val="000000"/>
-                </a:solidFill>
-                <a:latin typeface="Arial"/>
-              </a:rPr>
-              <a:t>e</a:t>
-            </a:r>
-            <a:r>
-              <a:rPr b="0" lang="pt-BR" sz="1800" spc="-1" strike="noStrike">
-                <a:solidFill>
-                  <a:srgbClr val="000000"/>
-                </a:solidFill>
-                <a:latin typeface="Arial"/>
-              </a:rPr>
-              <a:t>x</a:t>
-            </a:r>
-            <a:r>
-              <a:rPr b="0" lang="pt-BR" sz="1800" spc="-1" strike="noStrike">
-                <a:solidFill>
-                  <a:srgbClr val="000000"/>
-                </a:solidFill>
-                <a:latin typeface="Arial"/>
-              </a:rPr>
-              <a:t>t</a:t>
-            </a:r>
-            <a:r>
-              <a:rPr b="0" lang="pt-BR" sz="1800" spc="-1" strike="noStrike">
-                <a:solidFill>
-                  <a:srgbClr val="000000"/>
-                </a:solidFill>
-                <a:latin typeface="Arial"/>
-              </a:rPr>
-              <a:t> </a:t>
-            </a:r>
-            <a:r>
-              <a:rPr b="0" lang="pt-BR" sz="1800" spc="-1" strike="noStrike">
-                <a:solidFill>
-                  <a:srgbClr val="000000"/>
-                </a:solidFill>
-                <a:latin typeface="Arial"/>
-              </a:rPr>
-              <a:t>f</a:t>
-            </a:r>
-            <a:r>
-              <a:rPr b="0" lang="pt-BR" sz="1800" spc="-1" strike="noStrike">
-                <a:solidFill>
-                  <a:srgbClr val="000000"/>
-                </a:solidFill>
-                <a:latin typeface="Arial"/>
-              </a:rPr>
-              <a:t>o</a:t>
-            </a:r>
-            <a:r>
-              <a:rPr b="0" lang="pt-BR" sz="1800" spc="-1" strike="noStrike">
-                <a:solidFill>
-                  <a:srgbClr val="000000"/>
-                </a:solidFill>
-                <a:latin typeface="Arial"/>
-              </a:rPr>
-              <a:t>r</a:t>
-            </a:r>
-            <a:r>
-              <a:rPr b="0" lang="pt-BR" sz="1800" spc="-1" strike="noStrike">
-                <a:solidFill>
-                  <a:srgbClr val="000000"/>
-                </a:solidFill>
-                <a:latin typeface="Arial"/>
-              </a:rPr>
-              <a:t>m</a:t>
-            </a:r>
-            <a:r>
-              <a:rPr b="0" lang="pt-BR" sz="1800" spc="-1" strike="noStrike">
-                <a:solidFill>
-                  <a:srgbClr val="000000"/>
-                </a:solidFill>
-                <a:latin typeface="Arial"/>
-              </a:rPr>
-              <a:t>a</a:t>
-            </a:r>
-            <a:r>
-              <a:rPr b="0" lang="pt-BR" sz="1800" spc="-1" strike="noStrike">
-                <a:solidFill>
-                  <a:srgbClr val="000000"/>
-                </a:solidFill>
-                <a:latin typeface="Arial"/>
-              </a:rPr>
-              <a:t>t</a:t>
-            </a:r>
-            <a:endParaRPr b="0" lang="pt-BR" sz="1800" spc="-1" strike="noStrike">
-              <a:solidFill>
-                <a:srgbClr val="000000"/>
-              </a:solidFill>
+            <a:endParaRPr b="0" lang="pt-BR" sz="4400" spc="-1" strike="noStrike">
               <a:latin typeface="Arial"/>
             </a:endParaRPr>
           </a:p>
@@ -7784,18 +6881,12 @@
               <a:buChar char=""/>
             </a:pPr>
             <a:r>
-              <a:rPr b="0" lang="pt-BR" sz="1800" spc="-1" strike="noStrike">
-                <a:solidFill>
-                  <a:srgbClr val="000000"/>
-                </a:solidFill>
+              <a:rPr b="0" lang="pt-BR" sz="3200" spc="-1" strike="noStrike">
                 <a:latin typeface="Arial"/>
               </a:rPr>
               <a:t>Click to edit the outline text format</a:t>
             </a:r>
-            <a:endParaRPr b="0" lang="pt-BR" sz="1800" spc="-1" strike="noStrike">
-              <a:solidFill>
-                <a:srgbClr val="000000"/>
-              </a:solidFill>
+            <a:endParaRPr b="0" lang="pt-BR" sz="3200" spc="-1" strike="noStrike">
               <a:latin typeface="Arial"/>
             </a:endParaRPr>
           </a:p>
@@ -7812,18 +6903,12 @@
               <a:buChar char=""/>
             </a:pPr>
             <a:r>
-              <a:rPr b="0" lang="pt-BR" sz="1800" spc="-1" strike="noStrike">
-                <a:solidFill>
-                  <a:srgbClr val="000000"/>
-                </a:solidFill>
+              <a:rPr b="0" lang="pt-BR" sz="2800" spc="-1" strike="noStrike">
                 <a:latin typeface="Arial"/>
               </a:rPr>
               <a:t>Second Outline Level</a:t>
             </a:r>
-            <a:endParaRPr b="0" lang="pt-BR" sz="1800" spc="-1" strike="noStrike">
-              <a:solidFill>
-                <a:srgbClr val="000000"/>
-              </a:solidFill>
+            <a:endParaRPr b="0" lang="pt-BR" sz="2800" spc="-1" strike="noStrike">
               <a:latin typeface="Arial"/>
             </a:endParaRPr>
           </a:p>
@@ -7840,18 +6925,12 @@
               <a:buChar char=""/>
             </a:pPr>
             <a:r>
-              <a:rPr b="0" lang="pt-BR" sz="1800" spc="-1" strike="noStrike">
-                <a:solidFill>
-                  <a:srgbClr val="000000"/>
-                </a:solidFill>
+              <a:rPr b="0" lang="pt-BR" sz="2400" spc="-1" strike="noStrike">
                 <a:latin typeface="Arial"/>
               </a:rPr>
               <a:t>Third Outline Level</a:t>
             </a:r>
-            <a:endParaRPr b="0" lang="pt-BR" sz="1800" spc="-1" strike="noStrike">
-              <a:solidFill>
-                <a:srgbClr val="000000"/>
-              </a:solidFill>
+            <a:endParaRPr b="0" lang="pt-BR" sz="2400" spc="-1" strike="noStrike">
               <a:latin typeface="Arial"/>
             </a:endParaRPr>
           </a:p>
@@ -7868,18 +6947,12 @@
               <a:buChar char=""/>
             </a:pPr>
             <a:r>
-              <a:rPr b="0" lang="pt-BR" sz="1800" spc="-1" strike="noStrike">
-                <a:solidFill>
-                  <a:srgbClr val="000000"/>
-                </a:solidFill>
+              <a:rPr b="0" lang="pt-BR" sz="2000" spc="-1" strike="noStrike">
                 <a:latin typeface="Arial"/>
               </a:rPr>
               <a:t>Fourth Outline Level</a:t>
             </a:r>
-            <a:endParaRPr b="0" lang="pt-BR" sz="1800" spc="-1" strike="noStrike">
-              <a:solidFill>
-                <a:srgbClr val="000000"/>
-              </a:solidFill>
+            <a:endParaRPr b="0" lang="pt-BR" sz="2000" spc="-1" strike="noStrike">
               <a:latin typeface="Arial"/>
             </a:endParaRPr>
           </a:p>
@@ -7897,17 +6970,11 @@
             </a:pPr>
             <a:r>
               <a:rPr b="0" lang="pt-BR" sz="2000" spc="-1" strike="noStrike">
-                <a:solidFill>
-                  <a:srgbClr val="000000"/>
-                </a:solidFill>
                 <a:latin typeface="Arial"/>
               </a:rPr>
               <a:t>Fifth Outline Level</a:t>
             </a:r>
             <a:endParaRPr b="0" lang="pt-BR" sz="2000" spc="-1" strike="noStrike">
-              <a:solidFill>
-                <a:srgbClr val="000000"/>
-              </a:solidFill>
               <a:latin typeface="Arial"/>
             </a:endParaRPr>
           </a:p>
@@ -7925,17 +6992,11 @@
             </a:pPr>
             <a:r>
               <a:rPr b="0" lang="pt-BR" sz="2000" spc="-1" strike="noStrike">
-                <a:solidFill>
-                  <a:srgbClr val="000000"/>
-                </a:solidFill>
                 <a:latin typeface="Arial"/>
               </a:rPr>
               <a:t>Sixth Outline Level</a:t>
             </a:r>
             <a:endParaRPr b="0" lang="pt-BR" sz="2000" spc="-1" strike="noStrike">
-              <a:solidFill>
-                <a:srgbClr val="000000"/>
-              </a:solidFill>
               <a:latin typeface="Arial"/>
             </a:endParaRPr>
           </a:p>
@@ -7953,17 +7014,11 @@
             </a:pPr>
             <a:r>
               <a:rPr b="0" lang="pt-BR" sz="2000" spc="-1" strike="noStrike">
-                <a:solidFill>
-                  <a:srgbClr val="000000"/>
-                </a:solidFill>
                 <a:latin typeface="Arial"/>
               </a:rPr>
               <a:t>Seventh Outline Level</a:t>
             </a:r>
             <a:endParaRPr b="0" lang="pt-BR" sz="2000" spc="-1" strike="noStrike">
-              <a:solidFill>
-                <a:srgbClr val="000000"/>
-              </a:solidFill>
               <a:latin typeface="Arial"/>
             </a:endParaRPr>
           </a:p>
@@ -8019,7 +7074,7 @@
         <p:spPr>
           <a:xfrm>
             <a:off x="7440840" y="3315240"/>
-            <a:ext cx="2606040" cy="2185560"/>
+            <a:ext cx="2605680" cy="2185200"/>
           </a:xfrm>
           <a:prstGeom prst="rect">
             <a:avLst/>
@@ -8042,7 +7097,7 @@
         <p:spPr>
           <a:xfrm>
             <a:off x="8089200" y="5938920"/>
-            <a:ext cx="1957680" cy="419760"/>
+            <a:ext cx="1957320" cy="419400"/>
           </a:xfrm>
           <a:prstGeom prst="rect">
             <a:avLst/>
@@ -8065,7 +7120,7 @@
         <p:spPr>
           <a:xfrm>
             <a:off x="0" y="0"/>
-            <a:ext cx="12178440" cy="6857280"/>
+            <a:ext cx="12178080" cy="6856920"/>
           </a:xfrm>
           <a:prstGeom prst="rect">
             <a:avLst/>
@@ -8133,7 +7188,7 @@
         <p:spPr>
           <a:xfrm>
             <a:off x="966960" y="6363360"/>
-            <a:ext cx="2742480" cy="364320"/>
+            <a:ext cx="2742120" cy="363960"/>
           </a:xfrm>
           <a:prstGeom prst="rect">
             <a:avLst/>
@@ -8157,7 +7212,7 @@
                 <a:spcPct val="100000"/>
               </a:lnSpc>
             </a:pPr>
-            <a:fld id="{7E7DB036-9F16-41A1-85BE-8878E12A918B}" type="slidenum">
+            <a:fld id="{760133B2-2255-4925-9942-3A56157FCA9A}" type="slidenum">
               <a:rPr b="1" lang="pt-BR" sz="1200" spc="-1" strike="noStrike">
                 <a:solidFill>
                   <a:srgbClr val="002060"/>
@@ -8182,7 +7237,7 @@
         <p:spPr>
           <a:xfrm>
             <a:off x="262800" y="504000"/>
-            <a:ext cx="11619360" cy="5782320"/>
+            <a:ext cx="11619000" cy="5781960"/>
           </a:xfrm>
           <a:custGeom>
             <a:avLst/>
@@ -8264,7 +7319,7 @@
         <p:spPr>
           <a:xfrm>
             <a:off x="262800" y="1244880"/>
-            <a:ext cx="2019960" cy="287640"/>
+            <a:ext cx="2019600" cy="287280"/>
           </a:xfrm>
           <a:prstGeom prst="rect">
             <a:avLst/>
@@ -8339,7 +7394,7 @@
         <p:spPr>
           <a:xfrm>
             <a:off x="966960" y="6363360"/>
-            <a:ext cx="2742480" cy="364320"/>
+            <a:ext cx="2742120" cy="363960"/>
           </a:xfrm>
           <a:prstGeom prst="rect">
             <a:avLst/>
@@ -8363,7 +7418,7 @@
                 <a:spcPct val="100000"/>
               </a:lnSpc>
             </a:pPr>
-            <a:fld id="{5A249CA1-9653-499B-BBAB-723FF8AB1E18}" type="slidenum">
+            <a:fld id="{434B79E8-0516-4C65-8E33-EF30F800F8B1}" type="slidenum">
               <a:rPr b="1" lang="pt-BR" sz="1200" spc="-1" strike="noStrike">
                 <a:solidFill>
                   <a:srgbClr val="002060"/>
@@ -8388,7 +7443,7 @@
         <p:spPr>
           <a:xfrm>
             <a:off x="262800" y="1244880"/>
-            <a:ext cx="2019960" cy="287640"/>
+            <a:ext cx="2019600" cy="287280"/>
           </a:xfrm>
           <a:prstGeom prst="rect">
             <a:avLst/>
@@ -8418,7 +7473,7 @@
         <p:spPr>
           <a:xfrm>
             <a:off x="1452600" y="142920"/>
-            <a:ext cx="9000720" cy="6357600"/>
+            <a:ext cx="9000360" cy="6357240"/>
           </a:xfrm>
           <a:prstGeom prst="rect">
             <a:avLst/>
@@ -8486,7 +7541,7 @@
         <p:spPr>
           <a:xfrm>
             <a:off x="966960" y="6363360"/>
-            <a:ext cx="2742480" cy="364320"/>
+            <a:ext cx="2742120" cy="363960"/>
           </a:xfrm>
           <a:prstGeom prst="rect">
             <a:avLst/>
@@ -8510,7 +7565,7 @@
                 <a:spcPct val="100000"/>
               </a:lnSpc>
             </a:pPr>
-            <a:fld id="{4F440138-5BA2-4F01-9C5F-897604D23CCE}" type="slidenum">
+            <a:fld id="{E48C98CA-02EC-4885-9582-6F48C7971E56}" type="slidenum">
               <a:rPr b="1" lang="pt-BR" sz="1200" spc="-1" strike="noStrike">
                 <a:solidFill>
                   <a:srgbClr val="002060"/>
@@ -8535,7 +7590,7 @@
         <p:spPr>
           <a:xfrm>
             <a:off x="262800" y="504000"/>
-            <a:ext cx="11762280" cy="5424840"/>
+            <a:ext cx="11761920" cy="5424480"/>
           </a:xfrm>
           <a:custGeom>
             <a:avLst/>
@@ -8617,7 +7672,7 @@
         <p:spPr>
           <a:xfrm>
             <a:off x="2095560" y="4929120"/>
-            <a:ext cx="2019960" cy="287640"/>
+            <a:ext cx="2019600" cy="287280"/>
           </a:xfrm>
           <a:prstGeom prst="rect">
             <a:avLst/>
@@ -8692,7 +7747,7 @@
         <p:spPr>
           <a:xfrm>
             <a:off x="966960" y="6363360"/>
-            <a:ext cx="2742480" cy="364320"/>
+            <a:ext cx="2742120" cy="363960"/>
           </a:xfrm>
           <a:prstGeom prst="rect">
             <a:avLst/>
@@ -8716,7 +7771,7 @@
                 <a:spcPct val="100000"/>
               </a:lnSpc>
             </a:pPr>
-            <a:fld id="{4005CB9A-B044-4D26-9D5E-C5F36AA469EE}" type="slidenum">
+            <a:fld id="{2042FFF8-6F51-4833-B4B8-F2C9579A1FCF}" type="slidenum">
               <a:rPr b="1" lang="pt-BR" sz="1200" spc="-1" strike="noStrike">
                 <a:solidFill>
                   <a:srgbClr val="002060"/>
@@ -8741,7 +7796,7 @@
         <p:spPr>
           <a:xfrm>
             <a:off x="262800" y="1244880"/>
-            <a:ext cx="2019960" cy="287640"/>
+            <a:ext cx="2019600" cy="287280"/>
           </a:xfrm>
           <a:prstGeom prst="rect">
             <a:avLst/>
@@ -8771,7 +7826,7 @@
         <p:spPr>
           <a:xfrm>
             <a:off x="3238560" y="214200"/>
-            <a:ext cx="5571720" cy="6071760"/>
+            <a:ext cx="5571360" cy="6071400"/>
           </a:xfrm>
           <a:prstGeom prst="rect">
             <a:avLst/>
@@ -8839,7 +7894,7 @@
         <p:spPr>
           <a:xfrm>
             <a:off x="966960" y="6363360"/>
-            <a:ext cx="2742480" cy="364320"/>
+            <a:ext cx="2742120" cy="363960"/>
           </a:xfrm>
           <a:prstGeom prst="rect">
             <a:avLst/>
@@ -8863,7 +7918,7 @@
                 <a:spcPct val="100000"/>
               </a:lnSpc>
             </a:pPr>
-            <a:fld id="{AD53D6B5-4877-4601-8787-9233EB208E7C}" type="slidenum">
+            <a:fld id="{65B9332A-9B19-418F-853A-EB3639C76993}" type="slidenum">
               <a:rPr b="1" lang="pt-BR" sz="1200" spc="-1" strike="noStrike">
                 <a:solidFill>
                   <a:srgbClr val="002060"/>
@@ -8888,7 +7943,7 @@
         <p:spPr>
           <a:xfrm>
             <a:off x="380880" y="857160"/>
-            <a:ext cx="11501280" cy="4496400"/>
+            <a:ext cx="11500920" cy="4496040"/>
           </a:xfrm>
           <a:custGeom>
             <a:avLst/>
@@ -8980,7 +8035,7 @@
         <p:spPr>
           <a:xfrm>
             <a:off x="262800" y="1244880"/>
-            <a:ext cx="2019960" cy="287640"/>
+            <a:ext cx="2019600" cy="287280"/>
           </a:xfrm>
           <a:prstGeom prst="rect">
             <a:avLst/>
@@ -9055,7 +8110,7 @@
         <p:spPr>
           <a:xfrm>
             <a:off x="966960" y="6363360"/>
-            <a:ext cx="2742480" cy="364320"/>
+            <a:ext cx="2742120" cy="363960"/>
           </a:xfrm>
           <a:prstGeom prst="rect">
             <a:avLst/>
@@ -9079,7 +8134,7 @@
                 <a:spcPct val="100000"/>
               </a:lnSpc>
             </a:pPr>
-            <a:fld id="{1FCC8993-3864-41E5-87E1-E6D61A2C3665}" type="slidenum">
+            <a:fld id="{33D136F3-93AB-439C-8066-0C78372C8FD4}" type="slidenum">
               <a:rPr b="1" lang="pt-BR" sz="1200" spc="-1" strike="noStrike">
                 <a:solidFill>
                   <a:srgbClr val="002060"/>
@@ -9104,7 +8159,7 @@
         <p:spPr>
           <a:xfrm>
             <a:off x="8640000" y="650160"/>
-            <a:ext cx="2862720" cy="501480"/>
+            <a:ext cx="2862360" cy="501120"/>
           </a:xfrm>
           <a:custGeom>
             <a:avLst/>
@@ -9153,7 +8208,7 @@
         <p:spPr>
           <a:xfrm>
             <a:off x="262800" y="1244880"/>
-            <a:ext cx="2019960" cy="287640"/>
+            <a:ext cx="2019600" cy="287280"/>
           </a:xfrm>
           <a:prstGeom prst="rect">
             <a:avLst/>
@@ -9183,7 +8238,7 @@
         <p:spPr>
           <a:xfrm>
             <a:off x="595440" y="500040"/>
-            <a:ext cx="11215440" cy="5571720"/>
+            <a:ext cx="11215080" cy="5571360"/>
           </a:xfrm>
           <a:prstGeom prst="rect">
             <a:avLst/>
@@ -9202,7 +8257,7 @@
         <p:spPr>
           <a:xfrm>
             <a:off x="682200" y="428760"/>
-            <a:ext cx="1349640" cy="639000"/>
+            <a:ext cx="1349280" cy="638640"/>
           </a:xfrm>
           <a:prstGeom prst="rect">
             <a:avLst/>
@@ -9221,7 +8276,7 @@
         <p:txBody>
           <a:bodyPr wrap="none" lIns="90000" rIns="90000" tIns="45000" bIns="45000"/>
           <a:p>
-            <a:pPr indent="-216000">
+            <a:pPr marL="216000" indent="-215640">
               <a:lnSpc>
                 <a:spcPct val="100000"/>
               </a:lnSpc>
@@ -9256,7 +8311,7 @@
             </a:endParaRPr>
           </a:p>
           <a:p>
-            <a:pPr indent="-216000">
+            <a:pPr marL="216000" indent="-215640">
               <a:lnSpc>
                 <a:spcPct val="100000"/>
               </a:lnSpc>
@@ -9350,7 +8405,7 @@
         <p:spPr>
           <a:xfrm>
             <a:off x="966960" y="6363360"/>
-            <a:ext cx="2742480" cy="364320"/>
+            <a:ext cx="2742120" cy="363960"/>
           </a:xfrm>
           <a:prstGeom prst="rect">
             <a:avLst/>
@@ -9374,7 +8429,7 @@
                 <a:spcPct val="100000"/>
               </a:lnSpc>
             </a:pPr>
-            <a:fld id="{D9E34988-4DF7-4347-87FE-C1B3E84A27E9}" type="slidenum">
+            <a:fld id="{F28D4680-E2C0-4866-9676-9DF60185225D}" type="slidenum">
               <a:rPr b="1" lang="pt-BR" sz="1200" spc="-1" strike="noStrike">
                 <a:solidFill>
                   <a:srgbClr val="002060"/>
@@ -9403,7 +8458,7 @@
         <p:spPr>
           <a:xfrm>
             <a:off x="666720" y="357120"/>
-            <a:ext cx="10929600" cy="5572080"/>
+            <a:ext cx="10929240" cy="5571720"/>
           </a:xfrm>
           <a:prstGeom prst="rect">
             <a:avLst/>
@@ -9471,7 +8526,7 @@
         <p:spPr>
           <a:xfrm>
             <a:off x="966960" y="6363360"/>
-            <a:ext cx="2742480" cy="364320"/>
+            <a:ext cx="2742120" cy="363960"/>
           </a:xfrm>
           <a:prstGeom prst="rect">
             <a:avLst/>
@@ -9495,7 +8550,7 @@
                 <a:spcPct val="100000"/>
               </a:lnSpc>
             </a:pPr>
-            <a:fld id="{1C370670-BA1C-4D53-A7BB-717435C74829}" type="slidenum">
+            <a:fld id="{4E6ABAA6-9F99-4737-83CF-02239E6D3B2A}" type="slidenum">
               <a:rPr b="1" lang="pt-BR" sz="1200" spc="-1" strike="noStrike">
                 <a:solidFill>
                   <a:srgbClr val="002060"/>
@@ -9520,7 +8575,7 @@
         <p:spPr>
           <a:xfrm>
             <a:off x="262800" y="1244880"/>
-            <a:ext cx="2019960" cy="287640"/>
+            <a:ext cx="2019600" cy="287280"/>
           </a:xfrm>
           <a:prstGeom prst="rect">
             <a:avLst/>
@@ -9550,7 +8605,7 @@
         <p:spPr>
           <a:xfrm>
             <a:off x="452520" y="285840"/>
-            <a:ext cx="11358360" cy="5571720"/>
+            <a:ext cx="11358000" cy="5571360"/>
           </a:xfrm>
           <a:prstGeom prst="rect">
             <a:avLst/>
@@ -9618,7 +8673,7 @@
         <p:spPr>
           <a:xfrm>
             <a:off x="966960" y="6363360"/>
-            <a:ext cx="2742480" cy="364320"/>
+            <a:ext cx="2742120" cy="363960"/>
           </a:xfrm>
           <a:prstGeom prst="rect">
             <a:avLst/>
@@ -9642,7 +8697,7 @@
                 <a:spcPct val="100000"/>
               </a:lnSpc>
             </a:pPr>
-            <a:fld id="{D33F4728-9250-4381-B72A-D4D17DB5B841}" type="slidenum">
+            <a:fld id="{F7AFFBBB-C2C8-439B-A5B0-58A603226DC7}" type="slidenum">
               <a:rPr b="1" lang="pt-BR" sz="1200" spc="-1" strike="noStrike">
                 <a:solidFill>
                   <a:srgbClr val="002060"/>
@@ -9667,7 +8722,7 @@
         <p:spPr>
           <a:xfrm>
             <a:off x="262800" y="1244880"/>
-            <a:ext cx="2019960" cy="287640"/>
+            <a:ext cx="2019600" cy="287280"/>
           </a:xfrm>
           <a:prstGeom prst="rect">
             <a:avLst/>
@@ -9697,7 +8752,7 @@
         <p:spPr>
           <a:xfrm>
             <a:off x="309600" y="214200"/>
-            <a:ext cx="11215440" cy="5714640"/>
+            <a:ext cx="11215080" cy="5714280"/>
           </a:xfrm>
           <a:prstGeom prst="rect">
             <a:avLst/>
@@ -9765,7 +8820,7 @@
         <p:spPr>
           <a:xfrm>
             <a:off x="966960" y="6363360"/>
-            <a:ext cx="2742480" cy="364320"/>
+            <a:ext cx="2742120" cy="363960"/>
           </a:xfrm>
           <a:prstGeom prst="rect">
             <a:avLst/>
@@ -9789,7 +8844,7 @@
                 <a:spcPct val="100000"/>
               </a:lnSpc>
             </a:pPr>
-            <a:fld id="{4D57E14D-3350-408B-BFF1-BA9402C3BE27}" type="slidenum">
+            <a:fld id="{CB5307E8-B2DE-4618-A888-89C762252157}" type="slidenum">
               <a:rPr b="1" lang="pt-BR" sz="1200" spc="-1" strike="noStrike">
                 <a:solidFill>
                   <a:srgbClr val="002060"/>
@@ -9814,7 +8869,7 @@
         <p:spPr>
           <a:xfrm>
             <a:off x="288000" y="720000"/>
-            <a:ext cx="10278720" cy="853200"/>
+            <a:ext cx="10278360" cy="852840"/>
           </a:xfrm>
           <a:custGeom>
             <a:avLst/>
@@ -9896,7 +8951,7 @@
         <p:spPr>
           <a:xfrm>
             <a:off x="1147680" y="2448000"/>
-            <a:ext cx="2019960" cy="287640"/>
+            <a:ext cx="2019600" cy="287280"/>
           </a:xfrm>
           <a:prstGeom prst="rect">
             <a:avLst/>
@@ -10060,7 +9115,7 @@
         <p:spPr>
           <a:xfrm>
             <a:off x="0" y="0"/>
-            <a:ext cx="12178440" cy="6857280"/>
+            <a:ext cx="12178080" cy="6856920"/>
           </a:xfrm>
           <a:prstGeom prst="rect">
             <a:avLst/>
@@ -10079,7 +9134,7 @@
         <p:spPr>
           <a:xfrm>
             <a:off x="4032000" y="2506680"/>
-            <a:ext cx="7535520" cy="2275920"/>
+            <a:ext cx="7535160" cy="2275560"/>
           </a:xfrm>
           <a:custGeom>
             <a:avLst/>
@@ -10201,7 +9256,7 @@
         <p:spPr>
           <a:xfrm>
             <a:off x="9776160" y="5952600"/>
-            <a:ext cx="153000" cy="212400"/>
+            <a:ext cx="152640" cy="212040"/>
           </a:xfrm>
           <a:custGeom>
             <a:avLst/>
@@ -10450,7 +9505,7 @@
         <p:spPr>
           <a:xfrm>
             <a:off x="9961560" y="5902200"/>
-            <a:ext cx="133560" cy="261720"/>
+            <a:ext cx="133200" cy="261360"/>
           </a:xfrm>
           <a:custGeom>
             <a:avLst/>
@@ -10591,7 +9646,7 @@
         <p:spPr>
           <a:xfrm>
             <a:off x="10130760" y="5952960"/>
-            <a:ext cx="192600" cy="211320"/>
+            <a:ext cx="192240" cy="210960"/>
           </a:xfrm>
           <a:custGeom>
             <a:avLst/>
@@ -10838,7 +9893,7 @@
         <p:spPr>
           <a:xfrm>
             <a:off x="10354320" y="5861160"/>
-            <a:ext cx="141480" cy="299160"/>
+            <a:ext cx="141120" cy="298800"/>
           </a:xfrm>
           <a:custGeom>
             <a:avLst/>
@@ -10979,7 +10034,7 @@
         <p:spPr>
           <a:xfrm>
             <a:off x="10513800" y="5952600"/>
-            <a:ext cx="185760" cy="212400"/>
+            <a:ext cx="185400" cy="212040"/>
           </a:xfrm>
           <a:custGeom>
             <a:avLst/>
@@ -11265,7 +10320,7 @@
         <p:spPr>
           <a:xfrm>
             <a:off x="10757520" y="5952960"/>
-            <a:ext cx="193320" cy="207000"/>
+            <a:ext cx="192960" cy="206640"/>
           </a:xfrm>
           <a:custGeom>
             <a:avLst/>
@@ -11430,7 +10485,7 @@
         <p:spPr>
           <a:xfrm>
             <a:off x="11014560" y="5957280"/>
-            <a:ext cx="62280" cy="202680"/>
+            <a:ext cx="61920" cy="202320"/>
           </a:xfrm>
           <a:prstGeom prst="rect">
             <a:avLst/>
@@ -11458,7 +10513,7 @@
         <p:spPr>
           <a:xfrm>
             <a:off x="11138400" y="5952960"/>
-            <a:ext cx="193680" cy="207000"/>
+            <a:ext cx="193320" cy="206640"/>
           </a:xfrm>
           <a:custGeom>
             <a:avLst/>
@@ -11623,7 +10678,7 @@
         <p:spPr>
           <a:xfrm>
             <a:off x="11395800" y="5957280"/>
-            <a:ext cx="62280" cy="202680"/>
+            <a:ext cx="61920" cy="202320"/>
           </a:xfrm>
           <a:prstGeom prst="rect">
             <a:avLst/>
@@ -11651,7 +10706,7 @@
         <p:spPr>
           <a:xfrm>
             <a:off x="10382400" y="6225480"/>
-            <a:ext cx="36720" cy="59400"/>
+            <a:ext cx="36360" cy="59040"/>
           </a:xfrm>
           <a:custGeom>
             <a:avLst/>
@@ -11784,7 +10839,7 @@
         <p:spPr>
           <a:xfrm>
             <a:off x="10432800" y="6225480"/>
-            <a:ext cx="43560" cy="60120"/>
+            <a:ext cx="43200" cy="59760"/>
           </a:xfrm>
           <a:custGeom>
             <a:avLst/>
@@ -11959,7 +11014,7 @@
         <p:spPr>
           <a:xfrm>
             <a:off x="10488600" y="6225840"/>
-            <a:ext cx="65880" cy="59040"/>
+            <a:ext cx="65520" cy="58680"/>
           </a:xfrm>
           <a:custGeom>
             <a:avLst/>
@@ -12124,7 +11179,7 @@
         <p:spPr>
           <a:xfrm>
             <a:off x="10568880" y="6225840"/>
-            <a:ext cx="27720" cy="59040"/>
+            <a:ext cx="27360" cy="58680"/>
           </a:xfrm>
           <a:custGeom>
             <a:avLst/>
@@ -12199,7 +11254,7 @@
         <p:spPr>
           <a:xfrm>
             <a:off x="10613160" y="6225480"/>
-            <a:ext cx="39240" cy="59400"/>
+            <a:ext cx="38880" cy="59040"/>
           </a:xfrm>
           <a:custGeom>
             <a:avLst/>
@@ -12338,7 +11393,7 @@
         <p:spPr>
           <a:xfrm>
             <a:off x="10667520" y="6225840"/>
-            <a:ext cx="10080" cy="59040"/>
+            <a:ext cx="9720" cy="58680"/>
           </a:xfrm>
           <a:prstGeom prst="rect">
             <a:avLst/>
@@ -12366,7 +11421,7 @@
         <p:spPr>
           <a:xfrm>
             <a:off x="10696680" y="6225840"/>
-            <a:ext cx="42840" cy="59040"/>
+            <a:ext cx="42480" cy="58680"/>
           </a:xfrm>
           <a:custGeom>
             <a:avLst/>
@@ -12492,7 +11547,7 @@
         <p:spPr>
           <a:xfrm>
             <a:off x="10755720" y="6225480"/>
-            <a:ext cx="41040" cy="60120"/>
+            <a:ext cx="40680" cy="59760"/>
           </a:xfrm>
           <a:custGeom>
             <a:avLst/>
@@ -12645,7 +11700,7 @@
         <p:spPr>
           <a:xfrm>
             <a:off x="10837800" y="6225840"/>
-            <a:ext cx="42480" cy="59040"/>
+            <a:ext cx="42120" cy="58680"/>
           </a:xfrm>
           <a:custGeom>
             <a:avLst/>
@@ -12714,7 +11769,7 @@
         <p:spPr>
           <a:xfrm>
             <a:off x="10890000" y="6225480"/>
-            <a:ext cx="43560" cy="60120"/>
+            <a:ext cx="43200" cy="59760"/>
           </a:xfrm>
           <a:custGeom>
             <a:avLst/>
@@ -12889,7 +11944,7 @@
         <p:spPr>
           <a:xfrm>
             <a:off x="10949760" y="6225840"/>
-            <a:ext cx="38880" cy="59760"/>
+            <a:ext cx="38520" cy="59400"/>
           </a:xfrm>
           <a:custGeom>
             <a:avLst/>
@@ -12988,7 +12043,7 @@
         <p:spPr>
           <a:xfrm>
             <a:off x="11007000" y="6225480"/>
-            <a:ext cx="38880" cy="59400"/>
+            <a:ext cx="38520" cy="59040"/>
           </a:xfrm>
           <a:custGeom>
             <a:avLst/>
@@ -13130,7 +12185,7 @@
         <p:spPr>
           <a:xfrm>
             <a:off x="11090160" y="6225480"/>
-            <a:ext cx="39240" cy="60120"/>
+            <a:ext cx="38880" cy="59760"/>
           </a:xfrm>
           <a:custGeom>
             <a:avLst/>
@@ -13321,7 +12376,7 @@
         <p:spPr>
           <a:xfrm>
             <a:off x="11145240" y="6225840"/>
-            <a:ext cx="38160" cy="59760"/>
+            <a:ext cx="37800" cy="59400"/>
           </a:xfrm>
           <a:custGeom>
             <a:avLst/>
@@ -13420,7 +12475,7 @@
         <p:spPr>
           <a:xfrm>
             <a:off x="11198520" y="6225480"/>
-            <a:ext cx="33120" cy="60120"/>
+            <a:ext cx="32760" cy="59760"/>
           </a:xfrm>
           <a:custGeom>
             <a:avLst/>
@@ -13600,7 +12655,7 @@
         <p:spPr>
           <a:xfrm>
             <a:off x="11248560" y="6225840"/>
-            <a:ext cx="10080" cy="59040"/>
+            <a:ext cx="9720" cy="58680"/>
           </a:xfrm>
           <a:prstGeom prst="rect">
             <a:avLst/>
@@ -13628,7 +12683,7 @@
         <p:spPr>
           <a:xfrm>
             <a:off x="11277360" y="6225840"/>
-            <a:ext cx="42840" cy="59040"/>
+            <a:ext cx="42480" cy="58680"/>
           </a:xfrm>
           <a:custGeom>
             <a:avLst/>
@@ -13754,7 +12809,7 @@
         <p:spPr>
           <a:xfrm>
             <a:off x="11338560" y="6225840"/>
-            <a:ext cx="28440" cy="59040"/>
+            <a:ext cx="28080" cy="58680"/>
           </a:xfrm>
           <a:custGeom>
             <a:avLst/>
@@ -13829,7 +12884,7 @@
         <p:spPr>
           <a:xfrm>
             <a:off x="11379960" y="6225480"/>
-            <a:ext cx="32400" cy="60120"/>
+            <a:ext cx="32040" cy="59760"/>
           </a:xfrm>
           <a:custGeom>
             <a:avLst/>
@@ -14009,7 +13064,7 @@
         <p:spPr>
           <a:xfrm>
             <a:off x="11425320" y="6225480"/>
-            <a:ext cx="32400" cy="60120"/>
+            <a:ext cx="32040" cy="59760"/>
           </a:xfrm>
           <a:custGeom>
             <a:avLst/>
@@ -14189,7 +13244,7 @@
         <p:spPr>
           <a:xfrm>
             <a:off x="9481320" y="5962680"/>
-            <a:ext cx="92160" cy="88920"/>
+            <a:ext cx="91800" cy="88560"/>
           </a:xfrm>
           <a:custGeom>
             <a:avLst/>
@@ -14331,7 +13386,7 @@
         <p:spPr>
           <a:xfrm>
             <a:off x="9487080" y="6011280"/>
-            <a:ext cx="221760" cy="233280"/>
+            <a:ext cx="221400" cy="232920"/>
           </a:xfrm>
           <a:custGeom>
             <a:avLst/>
@@ -14487,7 +13542,7 @@
         <p:spPr>
           <a:xfrm>
             <a:off x="9468000" y="5998320"/>
-            <a:ext cx="103680" cy="160200"/>
+            <a:ext cx="103320" cy="159840"/>
           </a:xfrm>
           <a:custGeom>
             <a:avLst/>
@@ -14610,7 +13665,7 @@
         <p:spPr>
           <a:xfrm>
             <a:off x="9550080" y="6103080"/>
-            <a:ext cx="171000" cy="181440"/>
+            <a:ext cx="170640" cy="181080"/>
           </a:xfrm>
           <a:custGeom>
             <a:avLst/>
@@ -14766,7 +13821,7 @@
         <p:spPr>
           <a:xfrm>
             <a:off x="9636120" y="6189120"/>
-            <a:ext cx="92880" cy="92520"/>
+            <a:ext cx="92520" cy="92160"/>
           </a:xfrm>
           <a:custGeom>
             <a:avLst/>
@@ -14963,7 +14018,7 @@
         <p:spPr>
           <a:xfrm>
             <a:off x="0" y="0"/>
-            <a:ext cx="12178440" cy="6857280"/>
+            <a:ext cx="12178080" cy="6856920"/>
           </a:xfrm>
           <a:prstGeom prst="rect">
             <a:avLst/>
@@ -14982,7 +14037,7 @@
         <p:spPr>
           <a:xfrm>
             <a:off x="5095440" y="3234960"/>
-            <a:ext cx="223200" cy="309960"/>
+            <a:ext cx="222840" cy="309600"/>
           </a:xfrm>
           <a:custGeom>
             <a:avLst/>
@@ -15231,7 +14286,7 @@
         <p:spPr>
           <a:xfrm>
             <a:off x="5365800" y="3161520"/>
-            <a:ext cx="195120" cy="382320"/>
+            <a:ext cx="194760" cy="381960"/>
           </a:xfrm>
           <a:custGeom>
             <a:avLst/>
@@ -15372,7 +14427,7 @@
         <p:spPr>
           <a:xfrm>
             <a:off x="5612760" y="3235320"/>
-            <a:ext cx="281160" cy="308520"/>
+            <a:ext cx="280800" cy="308160"/>
           </a:xfrm>
           <a:custGeom>
             <a:avLst/>
@@ -15619,7 +14674,7 @@
         <p:spPr>
           <a:xfrm>
             <a:off x="5938560" y="3101400"/>
-            <a:ext cx="206640" cy="436320"/>
+            <a:ext cx="206280" cy="435960"/>
           </a:xfrm>
           <a:custGeom>
             <a:avLst/>
@@ -15760,7 +14815,7 @@
         <p:spPr>
           <a:xfrm>
             <a:off x="6171480" y="3234960"/>
-            <a:ext cx="271080" cy="309960"/>
+            <a:ext cx="270720" cy="309600"/>
           </a:xfrm>
           <a:custGeom>
             <a:avLst/>
@@ -16046,7 +15101,7 @@
         <p:spPr>
           <a:xfrm>
             <a:off x="6526800" y="3235320"/>
-            <a:ext cx="282600" cy="302400"/>
+            <a:ext cx="282240" cy="302040"/>
           </a:xfrm>
           <a:custGeom>
             <a:avLst/>
@@ -16211,7 +15266,7 @@
         <p:spPr>
           <a:xfrm>
             <a:off x="6901560" y="3241800"/>
-            <a:ext cx="91080" cy="295920"/>
+            <a:ext cx="90720" cy="295560"/>
           </a:xfrm>
           <a:prstGeom prst="rect">
             <a:avLst/>
@@ -16239,7 +15294,7 @@
         <p:spPr>
           <a:xfrm>
             <a:off x="7082280" y="3235320"/>
-            <a:ext cx="282960" cy="302400"/>
+            <a:ext cx="282600" cy="302040"/>
           </a:xfrm>
           <a:custGeom>
             <a:avLst/>
@@ -16404,7 +15459,7 @@
         <p:spPr>
           <a:xfrm>
             <a:off x="7457400" y="3241800"/>
-            <a:ext cx="91080" cy="295920"/>
+            <a:ext cx="90720" cy="295560"/>
           </a:xfrm>
           <a:prstGeom prst="rect">
             <a:avLst/>
@@ -16432,7 +15487,7 @@
         <p:spPr>
           <a:xfrm>
             <a:off x="5979600" y="3633120"/>
-            <a:ext cx="54000" cy="87120"/>
+            <a:ext cx="53640" cy="86760"/>
           </a:xfrm>
           <a:custGeom>
             <a:avLst/>
@@ -16565,7 +15620,7 @@
         <p:spPr>
           <a:xfrm>
             <a:off x="6053040" y="3633120"/>
-            <a:ext cx="63720" cy="88200"/>
+            <a:ext cx="63360" cy="87840"/>
           </a:xfrm>
           <a:custGeom>
             <a:avLst/>
@@ -16740,7 +15795,7 @@
         <p:spPr>
           <a:xfrm>
             <a:off x="6134400" y="3633480"/>
-            <a:ext cx="96480" cy="86760"/>
+            <a:ext cx="96120" cy="86400"/>
           </a:xfrm>
           <a:custGeom>
             <a:avLst/>
@@ -16917,7 +15972,7 @@
         <p:spPr>
           <a:xfrm>
             <a:off x="6251760" y="3633480"/>
-            <a:ext cx="40680" cy="86760"/>
+            <a:ext cx="40320" cy="86400"/>
           </a:xfrm>
           <a:custGeom>
             <a:avLst/>
@@ -16992,7 +16047,7 @@
         <p:spPr>
           <a:xfrm>
             <a:off x="6316200" y="3633120"/>
-            <a:ext cx="57240" cy="87120"/>
+            <a:ext cx="56880" cy="86760"/>
           </a:xfrm>
           <a:custGeom>
             <a:avLst/>
@@ -17137,7 +16192,7 @@
         <p:spPr>
           <a:xfrm>
             <a:off x="6395400" y="3633480"/>
-            <a:ext cx="15120" cy="86760"/>
+            <a:ext cx="14760" cy="86400"/>
           </a:xfrm>
           <a:prstGeom prst="rect">
             <a:avLst/>
@@ -17165,7 +16220,7 @@
         <p:spPr>
           <a:xfrm>
             <a:off x="6437880" y="3633480"/>
-            <a:ext cx="62640" cy="86760"/>
+            <a:ext cx="62280" cy="86400"/>
           </a:xfrm>
           <a:custGeom>
             <a:avLst/>
@@ -17297,7 +16352,7 @@
         <p:spPr>
           <a:xfrm>
             <a:off x="6523920" y="3633120"/>
-            <a:ext cx="60120" cy="88200"/>
+            <a:ext cx="59760" cy="87840"/>
           </a:xfrm>
           <a:custGeom>
             <a:avLst/>
@@ -17450,7 +16505,7 @@
         <p:spPr>
           <a:xfrm>
             <a:off x="6643800" y="3633480"/>
-            <a:ext cx="62280" cy="86760"/>
+            <a:ext cx="61920" cy="86400"/>
           </a:xfrm>
           <a:custGeom>
             <a:avLst/>
@@ -17519,7 +16574,7 @@
         <p:spPr>
           <a:xfrm>
             <a:off x="6719760" y="3633120"/>
-            <a:ext cx="63720" cy="88200"/>
+            <a:ext cx="63360" cy="87840"/>
           </a:xfrm>
           <a:custGeom>
             <a:avLst/>
@@ -17694,7 +16749,7 @@
         <p:spPr>
           <a:xfrm>
             <a:off x="6807240" y="3633480"/>
-            <a:ext cx="56880" cy="87840"/>
+            <a:ext cx="56520" cy="87480"/>
           </a:xfrm>
           <a:custGeom>
             <a:avLst/>
@@ -17793,7 +16848,7 @@
         <p:spPr>
           <a:xfrm>
             <a:off x="6890760" y="3633120"/>
-            <a:ext cx="56880" cy="87120"/>
+            <a:ext cx="56520" cy="86760"/>
           </a:xfrm>
           <a:custGeom>
             <a:avLst/>
@@ -17938,7 +16993,7 @@
         <p:spPr>
           <a:xfrm>
             <a:off x="7011720" y="3633120"/>
-            <a:ext cx="57240" cy="88200"/>
+            <a:ext cx="56880" cy="87840"/>
           </a:xfrm>
           <a:custGeom>
             <a:avLst/>
@@ -18132,7 +17187,7 @@
         <p:spPr>
           <a:xfrm>
             <a:off x="7092000" y="3633480"/>
-            <a:ext cx="56160" cy="87840"/>
+            <a:ext cx="55800" cy="87480"/>
           </a:xfrm>
           <a:custGeom>
             <a:avLst/>
@@ -18231,7 +17286,7 @@
         <p:spPr>
           <a:xfrm>
             <a:off x="7170120" y="3633120"/>
-            <a:ext cx="48600" cy="88200"/>
+            <a:ext cx="48240" cy="87840"/>
           </a:xfrm>
           <a:custGeom>
             <a:avLst/>
@@ -18411,7 +17466,7 @@
         <p:spPr>
           <a:xfrm>
             <a:off x="7242840" y="3633480"/>
-            <a:ext cx="15120" cy="86760"/>
+            <a:ext cx="14760" cy="86400"/>
           </a:xfrm>
           <a:prstGeom prst="rect">
             <a:avLst/>
@@ -18439,7 +17494,7 @@
         <p:spPr>
           <a:xfrm>
             <a:off x="7284960" y="3633480"/>
-            <a:ext cx="62640" cy="86760"/>
+            <a:ext cx="62280" cy="86400"/>
           </a:xfrm>
           <a:custGeom>
             <a:avLst/>
@@ -18571,7 +17626,7 @@
         <p:spPr>
           <a:xfrm>
             <a:off x="7373880" y="3633480"/>
-            <a:ext cx="41760" cy="86760"/>
+            <a:ext cx="41400" cy="86400"/>
           </a:xfrm>
           <a:custGeom>
             <a:avLst/>
@@ -18646,7 +17701,7 @@
         <p:spPr>
           <a:xfrm>
             <a:off x="7434720" y="3633120"/>
-            <a:ext cx="47520" cy="88200"/>
+            <a:ext cx="47160" cy="87840"/>
           </a:xfrm>
           <a:custGeom>
             <a:avLst/>
@@ -18826,7 +17881,7 @@
         <p:spPr>
           <a:xfrm>
             <a:off x="7500960" y="3633120"/>
-            <a:ext cx="47520" cy="88200"/>
+            <a:ext cx="47160" cy="87840"/>
           </a:xfrm>
           <a:custGeom>
             <a:avLst/>
@@ -19006,7 +18061,7 @@
         <p:spPr>
           <a:xfrm>
             <a:off x="4665240" y="3249720"/>
-            <a:ext cx="135000" cy="129960"/>
+            <a:ext cx="134640" cy="129600"/>
           </a:xfrm>
           <a:custGeom>
             <a:avLst/>
@@ -19148,7 +18203,7 @@
         <p:spPr>
           <a:xfrm>
             <a:off x="4673880" y="3320640"/>
-            <a:ext cx="323640" cy="340560"/>
+            <a:ext cx="323280" cy="340200"/>
           </a:xfrm>
           <a:custGeom>
             <a:avLst/>
@@ -19304,7 +18359,7 @@
         <p:spPr>
           <a:xfrm>
             <a:off x="4645440" y="3301560"/>
-            <a:ext cx="151560" cy="234000"/>
+            <a:ext cx="151200" cy="233640"/>
           </a:xfrm>
           <a:custGeom>
             <a:avLst/>
@@ -19427,7 +18482,7 @@
         <p:spPr>
           <a:xfrm>
             <a:off x="4765320" y="3454560"/>
-            <a:ext cx="249840" cy="264960"/>
+            <a:ext cx="249480" cy="264600"/>
           </a:xfrm>
           <a:custGeom>
             <a:avLst/>
@@ -19583,7 +18638,7 @@
         <p:spPr>
           <a:xfrm>
             <a:off x="4890600" y="3579840"/>
-            <a:ext cx="136080" cy="135360"/>
+            <a:ext cx="135720" cy="135000"/>
           </a:xfrm>
           <a:custGeom>
             <a:avLst/>
@@ -19782,7 +18837,7 @@
         <p:spPr>
           <a:xfrm>
             <a:off x="966960" y="6363360"/>
-            <a:ext cx="2742480" cy="364320"/>
+            <a:ext cx="2742120" cy="363960"/>
           </a:xfrm>
           <a:prstGeom prst="rect">
             <a:avLst/>
@@ -19806,7 +18861,7 @@
                 <a:spcPct val="100000"/>
               </a:lnSpc>
             </a:pPr>
-            <a:fld id="{D3DE7771-2223-4377-ABF4-1D6B896E3DAF}" type="slidenum">
+            <a:fld id="{3FB1F166-EE63-4C87-989D-AA78DAA24CA1}" type="slidenum">
               <a:rPr b="1" lang="pt-BR" sz="1200" spc="-1" strike="noStrike">
                 <a:solidFill>
                   <a:srgbClr val="002060"/>
@@ -19831,7 +18886,7 @@
         <p:spPr>
           <a:xfrm>
             <a:off x="452520" y="500040"/>
-            <a:ext cx="11429640" cy="5714640"/>
+            <a:ext cx="11429280" cy="5714280"/>
           </a:xfrm>
           <a:custGeom>
             <a:avLst/>
@@ -19913,7 +18968,7 @@
         <p:spPr>
           <a:xfrm>
             <a:off x="262800" y="1244880"/>
-            <a:ext cx="2019960" cy="287640"/>
+            <a:ext cx="2019600" cy="287280"/>
           </a:xfrm>
           <a:prstGeom prst="rect">
             <a:avLst/>
@@ -19939,7 +18994,7 @@
         <p:spPr>
           <a:xfrm>
             <a:off x="270720" y="1569600"/>
-            <a:ext cx="5481000" cy="3501360"/>
+            <a:ext cx="5480640" cy="3501000"/>
           </a:xfrm>
           <a:prstGeom prst="rect">
             <a:avLst/>
@@ -20037,7 +19092,7 @@
         <p:spPr>
           <a:xfrm>
             <a:off x="966960" y="6363360"/>
-            <a:ext cx="2742480" cy="364320"/>
+            <a:ext cx="2742120" cy="363960"/>
           </a:xfrm>
           <a:prstGeom prst="rect">
             <a:avLst/>
@@ -20061,7 +19116,7 @@
                 <a:spcPct val="100000"/>
               </a:lnSpc>
             </a:pPr>
-            <a:fld id="{5FF458CA-BEF3-42A8-9713-BB36BC6BFEAC}" type="slidenum">
+            <a:fld id="{F72AEACF-4015-4B18-A713-A9E55C68FCC2}" type="slidenum">
               <a:rPr b="1" lang="pt-BR" sz="1200" spc="-1" strike="noStrike">
                 <a:solidFill>
                   <a:srgbClr val="002060"/>
@@ -20086,7 +19141,7 @@
         <p:spPr>
           <a:xfrm>
             <a:off x="214200" y="569880"/>
-            <a:ext cx="12668040" cy="930240"/>
+            <a:ext cx="12667680" cy="929880"/>
           </a:xfrm>
           <a:custGeom>
             <a:avLst/>
@@ -20178,7 +19233,7 @@
         <p:spPr>
           <a:xfrm>
             <a:off x="262800" y="1244880"/>
-            <a:ext cx="2019960" cy="287640"/>
+            <a:ext cx="2019600" cy="287280"/>
           </a:xfrm>
           <a:prstGeom prst="rect">
             <a:avLst/>
@@ -20207,8 +19262,8 @@
         </p:blipFill>
         <p:spPr>
           <a:xfrm>
-            <a:off x="1666800" y="1000080"/>
-            <a:ext cx="9215280" cy="5214600"/>
+            <a:off x="1666800" y="1252080"/>
+            <a:ext cx="9214920" cy="5214240"/>
           </a:xfrm>
           <a:prstGeom prst="rect">
             <a:avLst/>
@@ -20276,7 +19331,7 @@
         <p:spPr>
           <a:xfrm>
             <a:off x="966960" y="6363360"/>
-            <a:ext cx="2742480" cy="364320"/>
+            <a:ext cx="2742120" cy="363960"/>
           </a:xfrm>
           <a:prstGeom prst="rect">
             <a:avLst/>
@@ -20300,7 +19355,7 @@
                 <a:spcPct val="100000"/>
               </a:lnSpc>
             </a:pPr>
-            <a:fld id="{BE6F14FF-5E23-4317-862A-A7CE5B033C04}" type="slidenum">
+            <a:fld id="{5D79ECB2-E1EB-4290-92F1-58375CEA63B5}" type="slidenum">
               <a:rPr b="1" lang="pt-BR" sz="1200" spc="-1" strike="noStrike">
                 <a:solidFill>
                   <a:srgbClr val="002060"/>
@@ -20325,7 +19380,7 @@
         <p:spPr>
           <a:xfrm>
             <a:off x="0" y="428760"/>
-            <a:ext cx="12191760" cy="1436760"/>
+            <a:ext cx="12191400" cy="1436400"/>
           </a:xfrm>
           <a:custGeom>
             <a:avLst/>
@@ -20401,7 +19456,7 @@
         <p:spPr>
           <a:xfrm>
             <a:off x="1380960" y="1928880"/>
-            <a:ext cx="9140040" cy="4000320"/>
+            <a:ext cx="9139680" cy="3999960"/>
           </a:xfrm>
           <a:prstGeom prst="rect">
             <a:avLst/>
@@ -20469,7 +19524,7 @@
         <p:spPr>
           <a:xfrm>
             <a:off x="966960" y="6363360"/>
-            <a:ext cx="2742480" cy="364320"/>
+            <a:ext cx="2742120" cy="363960"/>
           </a:xfrm>
           <a:prstGeom prst="rect">
             <a:avLst/>
@@ -20493,7 +19548,7 @@
                 <a:spcPct val="100000"/>
               </a:lnSpc>
             </a:pPr>
-            <a:fld id="{8F716D1D-E942-40B8-90BA-F38904DC77DD}" type="slidenum">
+            <a:fld id="{F76CA732-7D9B-4593-8C8B-AA217F481F77}" type="slidenum">
               <a:rPr b="1" lang="pt-BR" sz="1200" spc="-1" strike="noStrike">
                 <a:solidFill>
                   <a:srgbClr val="002060"/>
@@ -20518,7 +19573,7 @@
         <p:spPr>
           <a:xfrm>
             <a:off x="452520" y="500040"/>
-            <a:ext cx="11429640" cy="856800"/>
+            <a:ext cx="11429280" cy="856440"/>
           </a:xfrm>
           <a:custGeom>
             <a:avLst/>
@@ -20590,7 +19645,7 @@
         <p:spPr>
           <a:xfrm>
             <a:off x="262800" y="1244880"/>
-            <a:ext cx="2019960" cy="287640"/>
+            <a:ext cx="2019600" cy="287280"/>
           </a:xfrm>
           <a:prstGeom prst="rect">
             <a:avLst/>
@@ -20616,7 +19671,7 @@
         <p:spPr>
           <a:xfrm>
             <a:off x="270720" y="1569600"/>
-            <a:ext cx="5481000" cy="3501360"/>
+            <a:ext cx="5480640" cy="3501000"/>
           </a:xfrm>
           <a:prstGeom prst="rect">
             <a:avLst/>
@@ -20669,7 +19724,7 @@
         <p:spPr>
           <a:xfrm>
             <a:off x="1881000" y="1785960"/>
-            <a:ext cx="7891200" cy="4694760"/>
+            <a:ext cx="7890840" cy="4694400"/>
           </a:xfrm>
           <a:prstGeom prst="rect">
             <a:avLst/>
@@ -20737,7 +19792,7 @@
         <p:spPr>
           <a:xfrm>
             <a:off x="966960" y="6363360"/>
-            <a:ext cx="2742480" cy="364320"/>
+            <a:ext cx="2742120" cy="363960"/>
           </a:xfrm>
           <a:prstGeom prst="rect">
             <a:avLst/>
@@ -20761,7 +19816,7 @@
                 <a:spcPct val="100000"/>
               </a:lnSpc>
             </a:pPr>
-            <a:fld id="{65A98EBB-6D87-423D-AA7F-71F2E74D639E}" type="slidenum">
+            <a:fld id="{696062AB-1BF0-4768-8DE8-4D8B0E87BA99}" type="slidenum">
               <a:rPr b="1" lang="pt-BR" sz="1200" spc="-1" strike="noStrike">
                 <a:solidFill>
                   <a:srgbClr val="002060"/>
@@ -20786,7 +19841,7 @@
         <p:spPr>
           <a:xfrm>
             <a:off x="0" y="1071720"/>
-            <a:ext cx="12191760" cy="1079640"/>
+            <a:ext cx="12191400" cy="1079280"/>
           </a:xfrm>
           <a:custGeom>
             <a:avLst/>
@@ -20872,7 +19927,7 @@
         <p:spPr>
           <a:xfrm>
             <a:off x="432000" y="2304000"/>
-            <a:ext cx="5210640" cy="2645280"/>
+            <a:ext cx="5210280" cy="2644920"/>
           </a:xfrm>
           <a:prstGeom prst="rect">
             <a:avLst/>
@@ -20895,7 +19950,7 @@
         <p:spPr>
           <a:xfrm>
             <a:off x="6480000" y="2088000"/>
-            <a:ext cx="5193000" cy="3095640"/>
+            <a:ext cx="5192640" cy="3095280"/>
           </a:xfrm>
           <a:prstGeom prst="rect">
             <a:avLst/>
@@ -20914,7 +19969,7 @@
         <p:spPr>
           <a:xfrm>
             <a:off x="5616000" y="3456000"/>
-            <a:ext cx="503640" cy="742320"/>
+            <a:ext cx="503280" cy="741960"/>
           </a:xfrm>
           <a:prstGeom prst="rect">
             <a:avLst/>
@@ -21012,7 +20067,7 @@
         <p:spPr>
           <a:xfrm>
             <a:off x="966960" y="6363360"/>
-            <a:ext cx="2742480" cy="364320"/>
+            <a:ext cx="2742120" cy="363960"/>
           </a:xfrm>
           <a:prstGeom prst="rect">
             <a:avLst/>
@@ -21036,7 +20091,7 @@
                 <a:spcPct val="100000"/>
               </a:lnSpc>
             </a:pPr>
-            <a:fld id="{83B1EB13-E87A-484A-91D3-C84E0DEE8E74}" type="slidenum">
+            <a:fld id="{1D39E077-C15D-4A29-8773-6FC9F12E1995}" type="slidenum">
               <a:rPr b="1" lang="pt-BR" sz="1200" spc="-1" strike="noStrike">
                 <a:solidFill>
                   <a:srgbClr val="002060"/>
@@ -21061,7 +20116,7 @@
         <p:spPr>
           <a:xfrm>
             <a:off x="237960" y="642960"/>
-            <a:ext cx="11715480" cy="1209960"/>
+            <a:ext cx="11715120" cy="1209600"/>
           </a:xfrm>
           <a:custGeom>
             <a:avLst/>
@@ -21133,7 +20188,7 @@
         <p:spPr>
           <a:xfrm>
             <a:off x="262800" y="1244880"/>
-            <a:ext cx="2019960" cy="287640"/>
+            <a:ext cx="2019600" cy="287280"/>
           </a:xfrm>
           <a:prstGeom prst="rect">
             <a:avLst/>
@@ -21163,7 +20218,7 @@
         <p:spPr>
           <a:xfrm>
             <a:off x="2309760" y="2643120"/>
-            <a:ext cx="7320600" cy="2333160"/>
+            <a:ext cx="7320240" cy="2332800"/>
           </a:xfrm>
           <a:prstGeom prst="rect">
             <a:avLst/>
@@ -21231,7 +20286,7 @@
         <p:spPr>
           <a:xfrm>
             <a:off x="966960" y="6363360"/>
-            <a:ext cx="2742480" cy="364320"/>
+            <a:ext cx="2742120" cy="363960"/>
           </a:xfrm>
           <a:prstGeom prst="rect">
             <a:avLst/>
@@ -21255,7 +20310,7 @@
                 <a:spcPct val="100000"/>
               </a:lnSpc>
             </a:pPr>
-            <a:fld id="{5F647867-5BA3-4F83-9E5C-685DB8BA1E4F}" type="slidenum">
+            <a:fld id="{80517E92-B2C0-4937-B20D-8D5A0BDF7FF0}" type="slidenum">
               <a:rPr b="1" lang="pt-BR" sz="1200" spc="-1" strike="noStrike">
                 <a:solidFill>
                   <a:srgbClr val="002060"/>
@@ -21280,7 +20335,7 @@
         <p:spPr>
           <a:xfrm>
             <a:off x="262800" y="1244880"/>
-            <a:ext cx="2019960" cy="287640"/>
+            <a:ext cx="2019600" cy="287280"/>
           </a:xfrm>
           <a:prstGeom prst="rect">
             <a:avLst/>
@@ -21306,7 +20361,7 @@
         <p:spPr>
           <a:xfrm>
             <a:off x="166680" y="285840"/>
-            <a:ext cx="11786760" cy="1209960"/>
+            <a:ext cx="11786400" cy="1209600"/>
           </a:xfrm>
           <a:custGeom>
             <a:avLst/>
@@ -21382,7 +20437,7 @@
         <p:spPr>
           <a:xfrm>
             <a:off x="880920" y="1428840"/>
-            <a:ext cx="10572480" cy="4571640"/>
+            <a:ext cx="10572120" cy="4571280"/>
           </a:xfrm>
           <a:prstGeom prst="rect">
             <a:avLst/>

</xml_diff>